<commit_message>
Reformatting and cleaning out extraneous files from the Git Repository not used in analysis or manuscript preparation
</commit_message>
<xml_diff>
--- a/Figures/Potential Manuscript Figures.pptx
+++ b/Figures/Potential Manuscript Figures.pptx
@@ -6,9 +6,10 @@
   </p:sldMasterIdLst>
   <p:sldIdLst>
     <p:sldId id="259" r:id="rId2"/>
-    <p:sldId id="260" r:id="rId3"/>
-    <p:sldId id="261" r:id="rId4"/>
-    <p:sldId id="256" r:id="rId5"/>
+    <p:sldId id="262" r:id="rId3"/>
+    <p:sldId id="260" r:id="rId4"/>
+    <p:sldId id="261" r:id="rId5"/>
+    <p:sldId id="256" r:id="rId6"/>
   </p:sldIdLst>
   <p:sldSz cx="12192000" cy="6858000"/>
   <p:notesSz cx="6858000" cy="9144000"/>
@@ -262,7 +263,7 @@
           <a:p>
             <a:fld id="{10AFAD13-EB5C-470C-A08F-77852304B040}" type="datetimeFigureOut">
               <a:rPr lang="en-US" smtClean="0"/>
-              <a:t>3/15/2023</a:t>
+              <a:t>10/31/2023</a:t>
             </a:fld>
             <a:endParaRPr lang="en-US"/>
           </a:p>
@@ -460,7 +461,7 @@
           <a:p>
             <a:fld id="{10AFAD13-EB5C-470C-A08F-77852304B040}" type="datetimeFigureOut">
               <a:rPr lang="en-US" smtClean="0"/>
-              <a:t>3/15/2023</a:t>
+              <a:t>10/31/2023</a:t>
             </a:fld>
             <a:endParaRPr lang="en-US"/>
           </a:p>
@@ -668,7 +669,7 @@
           <a:p>
             <a:fld id="{10AFAD13-EB5C-470C-A08F-77852304B040}" type="datetimeFigureOut">
               <a:rPr lang="en-US" smtClean="0"/>
-              <a:t>3/15/2023</a:t>
+              <a:t>10/31/2023</a:t>
             </a:fld>
             <a:endParaRPr lang="en-US"/>
           </a:p>
@@ -866,7 +867,7 @@
           <a:p>
             <a:fld id="{10AFAD13-EB5C-470C-A08F-77852304B040}" type="datetimeFigureOut">
               <a:rPr lang="en-US" smtClean="0"/>
-              <a:t>3/15/2023</a:t>
+              <a:t>10/31/2023</a:t>
             </a:fld>
             <a:endParaRPr lang="en-US"/>
           </a:p>
@@ -1141,7 +1142,7 @@
           <a:p>
             <a:fld id="{10AFAD13-EB5C-470C-A08F-77852304B040}" type="datetimeFigureOut">
               <a:rPr lang="en-US" smtClean="0"/>
-              <a:t>3/15/2023</a:t>
+              <a:t>10/31/2023</a:t>
             </a:fld>
             <a:endParaRPr lang="en-US"/>
           </a:p>
@@ -1406,7 +1407,7 @@
           <a:p>
             <a:fld id="{10AFAD13-EB5C-470C-A08F-77852304B040}" type="datetimeFigureOut">
               <a:rPr lang="en-US" smtClean="0"/>
-              <a:t>3/15/2023</a:t>
+              <a:t>10/31/2023</a:t>
             </a:fld>
             <a:endParaRPr lang="en-US"/>
           </a:p>
@@ -1818,7 +1819,7 @@
           <a:p>
             <a:fld id="{10AFAD13-EB5C-470C-A08F-77852304B040}" type="datetimeFigureOut">
               <a:rPr lang="en-US" smtClean="0"/>
-              <a:t>3/15/2023</a:t>
+              <a:t>10/31/2023</a:t>
             </a:fld>
             <a:endParaRPr lang="en-US"/>
           </a:p>
@@ -1959,7 +1960,7 @@
           <a:p>
             <a:fld id="{10AFAD13-EB5C-470C-A08F-77852304B040}" type="datetimeFigureOut">
               <a:rPr lang="en-US" smtClean="0"/>
-              <a:t>3/15/2023</a:t>
+              <a:t>10/31/2023</a:t>
             </a:fld>
             <a:endParaRPr lang="en-US"/>
           </a:p>
@@ -2072,7 +2073,7 @@
           <a:p>
             <a:fld id="{10AFAD13-EB5C-470C-A08F-77852304B040}" type="datetimeFigureOut">
               <a:rPr lang="en-US" smtClean="0"/>
-              <a:t>3/15/2023</a:t>
+              <a:t>10/31/2023</a:t>
             </a:fld>
             <a:endParaRPr lang="en-US"/>
           </a:p>
@@ -2383,7 +2384,7 @@
           <a:p>
             <a:fld id="{10AFAD13-EB5C-470C-A08F-77852304B040}" type="datetimeFigureOut">
               <a:rPr lang="en-US" smtClean="0"/>
-              <a:t>3/15/2023</a:t>
+              <a:t>10/31/2023</a:t>
             </a:fld>
             <a:endParaRPr lang="en-US"/>
           </a:p>
@@ -2671,7 +2672,7 @@
           <a:p>
             <a:fld id="{10AFAD13-EB5C-470C-A08F-77852304B040}" type="datetimeFigureOut">
               <a:rPr lang="en-US" smtClean="0"/>
-              <a:t>3/15/2023</a:t>
+              <a:t>10/31/2023</a:t>
             </a:fld>
             <a:endParaRPr lang="en-US"/>
           </a:p>
@@ -2912,7 +2913,7 @@
           <a:p>
             <a:fld id="{10AFAD13-EB5C-470C-A08F-77852304B040}" type="datetimeFigureOut">
               <a:rPr lang="en-US" smtClean="0"/>
-              <a:t>3/15/2023</a:t>
+              <a:t>10/31/2023</a:t>
             </a:fld>
             <a:endParaRPr lang="en-US"/>
           </a:p>
@@ -5939,6 +5940,2527 @@
       </p:grpSpPr>
       <p:grpSp>
         <p:nvGrpSpPr>
+          <p:cNvPr id="65" name="Group 64">
+            <a:extLst>
+              <a:ext uri="{FF2B5EF4-FFF2-40B4-BE49-F238E27FC236}">
+                <a16:creationId xmlns:a16="http://schemas.microsoft.com/office/drawing/2014/main" id="{E2E61269-1C1A-7B79-A160-C7CDAA2B09BC}"/>
+              </a:ext>
+            </a:extLst>
+          </p:cNvPr>
+          <p:cNvGrpSpPr/>
+          <p:nvPr/>
+        </p:nvGrpSpPr>
+        <p:grpSpPr>
+          <a:xfrm>
+            <a:off x="-12640" y="951868"/>
+            <a:ext cx="9987713" cy="4787085"/>
+            <a:chOff x="-12640" y="951868"/>
+            <a:chExt cx="9987713" cy="4787085"/>
+          </a:xfrm>
+        </p:grpSpPr>
+        <p:cxnSp>
+          <p:nvCxnSpPr>
+            <p:cNvPr id="76" name="Straight Connector 75">
+              <a:extLst>
+                <a:ext uri="{FF2B5EF4-FFF2-40B4-BE49-F238E27FC236}">
+                  <a16:creationId xmlns:a16="http://schemas.microsoft.com/office/drawing/2014/main" id="{F92457F5-46AC-7CE6-BE66-B2F3EE73F063}"/>
+                </a:ext>
+              </a:extLst>
+            </p:cNvPr>
+            <p:cNvCxnSpPr>
+              <a:cxnSpLocks/>
+              <a:stCxn id="7" idx="3"/>
+            </p:cNvCxnSpPr>
+            <p:nvPr/>
+          </p:nvCxnSpPr>
+          <p:spPr>
+            <a:xfrm>
+              <a:off x="1422992" y="5291265"/>
+              <a:ext cx="5699703" cy="0"/>
+            </a:xfrm>
+            <a:prstGeom prst="line">
+              <a:avLst/>
+            </a:prstGeom>
+            <a:ln>
+              <a:solidFill>
+                <a:schemeClr val="tx1"/>
+              </a:solidFill>
+            </a:ln>
+          </p:spPr>
+          <p:style>
+            <a:lnRef idx="1">
+              <a:schemeClr val="accent1"/>
+            </a:lnRef>
+            <a:fillRef idx="0">
+              <a:schemeClr val="accent1"/>
+            </a:fillRef>
+            <a:effectRef idx="0">
+              <a:schemeClr val="accent1"/>
+            </a:effectRef>
+            <a:fontRef idx="minor">
+              <a:schemeClr val="tx1"/>
+            </a:fontRef>
+          </p:style>
+        </p:cxnSp>
+        <p:cxnSp>
+          <p:nvCxnSpPr>
+            <p:cNvPr id="74" name="Straight Connector 73">
+              <a:extLst>
+                <a:ext uri="{FF2B5EF4-FFF2-40B4-BE49-F238E27FC236}">
+                  <a16:creationId xmlns:a16="http://schemas.microsoft.com/office/drawing/2014/main" id="{C884548A-5605-6A71-89CB-4910278897ED}"/>
+                </a:ext>
+              </a:extLst>
+            </p:cNvPr>
+            <p:cNvCxnSpPr>
+              <a:cxnSpLocks/>
+              <a:stCxn id="6" idx="3"/>
+            </p:cNvCxnSpPr>
+            <p:nvPr/>
+          </p:nvCxnSpPr>
+          <p:spPr>
+            <a:xfrm>
+              <a:off x="1422993" y="4557519"/>
+              <a:ext cx="5689759" cy="8655"/>
+            </a:xfrm>
+            <a:prstGeom prst="line">
+              <a:avLst/>
+            </a:prstGeom>
+            <a:ln>
+              <a:solidFill>
+                <a:schemeClr val="tx1"/>
+              </a:solidFill>
+            </a:ln>
+          </p:spPr>
+          <p:style>
+            <a:lnRef idx="1">
+              <a:schemeClr val="accent1"/>
+            </a:lnRef>
+            <a:fillRef idx="0">
+              <a:schemeClr val="accent1"/>
+            </a:fillRef>
+            <a:effectRef idx="0">
+              <a:schemeClr val="accent1"/>
+            </a:effectRef>
+            <a:fontRef idx="minor">
+              <a:schemeClr val="tx1"/>
+            </a:fontRef>
+          </p:style>
+        </p:cxnSp>
+        <p:cxnSp>
+          <p:nvCxnSpPr>
+            <p:cNvPr id="64" name="Straight Connector 63">
+              <a:extLst>
+                <a:ext uri="{FF2B5EF4-FFF2-40B4-BE49-F238E27FC236}">
+                  <a16:creationId xmlns:a16="http://schemas.microsoft.com/office/drawing/2014/main" id="{118DF10C-577F-59B9-AA45-426B0B1D3045}"/>
+                </a:ext>
+              </a:extLst>
+            </p:cNvPr>
+            <p:cNvCxnSpPr>
+              <a:cxnSpLocks/>
+              <a:stCxn id="67" idx="3"/>
+            </p:cNvCxnSpPr>
+            <p:nvPr/>
+          </p:nvCxnSpPr>
+          <p:spPr>
+            <a:xfrm>
+              <a:off x="1422991" y="3033705"/>
+              <a:ext cx="5699704" cy="10284"/>
+            </a:xfrm>
+            <a:prstGeom prst="line">
+              <a:avLst/>
+            </a:prstGeom>
+            <a:ln>
+              <a:solidFill>
+                <a:schemeClr val="tx1"/>
+              </a:solidFill>
+            </a:ln>
+          </p:spPr>
+          <p:style>
+            <a:lnRef idx="1">
+              <a:schemeClr val="accent1"/>
+            </a:lnRef>
+            <a:fillRef idx="0">
+              <a:schemeClr val="accent1"/>
+            </a:fillRef>
+            <a:effectRef idx="0">
+              <a:schemeClr val="accent1"/>
+            </a:effectRef>
+            <a:fontRef idx="minor">
+              <a:schemeClr val="tx1"/>
+            </a:fontRef>
+          </p:style>
+        </p:cxnSp>
+        <p:cxnSp>
+          <p:nvCxnSpPr>
+            <p:cNvPr id="73" name="Straight Connector 72">
+              <a:extLst>
+                <a:ext uri="{FF2B5EF4-FFF2-40B4-BE49-F238E27FC236}">
+                  <a16:creationId xmlns:a16="http://schemas.microsoft.com/office/drawing/2014/main" id="{FC62033D-7CBF-1068-8635-90EE01E35D6E}"/>
+                </a:ext>
+              </a:extLst>
+            </p:cNvPr>
+            <p:cNvCxnSpPr>
+              <a:cxnSpLocks/>
+            </p:cNvCxnSpPr>
+            <p:nvPr/>
+          </p:nvCxnSpPr>
+          <p:spPr>
+            <a:xfrm>
+              <a:off x="1422991" y="3742795"/>
+              <a:ext cx="5699704" cy="10284"/>
+            </a:xfrm>
+            <a:prstGeom prst="line">
+              <a:avLst/>
+            </a:prstGeom>
+            <a:ln>
+              <a:solidFill>
+                <a:schemeClr val="tx1"/>
+              </a:solidFill>
+            </a:ln>
+          </p:spPr>
+          <p:style>
+            <a:lnRef idx="1">
+              <a:schemeClr val="accent1"/>
+            </a:lnRef>
+            <a:fillRef idx="0">
+              <a:schemeClr val="accent1"/>
+            </a:fillRef>
+            <a:effectRef idx="0">
+              <a:schemeClr val="accent1"/>
+            </a:effectRef>
+            <a:fontRef idx="minor">
+              <a:schemeClr val="tx1"/>
+            </a:fontRef>
+          </p:style>
+        </p:cxnSp>
+        <p:cxnSp>
+          <p:nvCxnSpPr>
+            <p:cNvPr id="61" name="Straight Connector 60">
+              <a:extLst>
+                <a:ext uri="{FF2B5EF4-FFF2-40B4-BE49-F238E27FC236}">
+                  <a16:creationId xmlns:a16="http://schemas.microsoft.com/office/drawing/2014/main" id="{E25F597A-C8D8-DF7D-24CE-06A33BB0E42A}"/>
+                </a:ext>
+              </a:extLst>
+            </p:cNvPr>
+            <p:cNvCxnSpPr>
+              <a:cxnSpLocks/>
+              <a:stCxn id="8" idx="3"/>
+            </p:cNvCxnSpPr>
+            <p:nvPr/>
+          </p:nvCxnSpPr>
+          <p:spPr>
+            <a:xfrm>
+              <a:off x="1405098" y="2361373"/>
+              <a:ext cx="5723363" cy="13328"/>
+            </a:xfrm>
+            <a:prstGeom prst="line">
+              <a:avLst/>
+            </a:prstGeom>
+            <a:ln>
+              <a:solidFill>
+                <a:schemeClr val="tx1"/>
+              </a:solidFill>
+            </a:ln>
+          </p:spPr>
+          <p:style>
+            <a:lnRef idx="1">
+              <a:schemeClr val="accent1"/>
+            </a:lnRef>
+            <a:fillRef idx="0">
+              <a:schemeClr val="accent1"/>
+            </a:fillRef>
+            <a:effectRef idx="0">
+              <a:schemeClr val="accent1"/>
+            </a:effectRef>
+            <a:fontRef idx="minor">
+              <a:schemeClr val="tx1"/>
+            </a:fontRef>
+          </p:style>
+        </p:cxnSp>
+        <p:cxnSp>
+          <p:nvCxnSpPr>
+            <p:cNvPr id="58" name="Straight Connector 57">
+              <a:extLst>
+                <a:ext uri="{FF2B5EF4-FFF2-40B4-BE49-F238E27FC236}">
+                  <a16:creationId xmlns:a16="http://schemas.microsoft.com/office/drawing/2014/main" id="{04AB2D58-DB57-2508-A10C-DF62F40AF958}"/>
+                </a:ext>
+              </a:extLst>
+            </p:cNvPr>
+            <p:cNvCxnSpPr>
+              <a:cxnSpLocks/>
+              <a:stCxn id="9" idx="3"/>
+            </p:cNvCxnSpPr>
+            <p:nvPr/>
+          </p:nvCxnSpPr>
+          <p:spPr>
+            <a:xfrm>
+              <a:off x="1405098" y="1622689"/>
+              <a:ext cx="5723363" cy="4063"/>
+            </a:xfrm>
+            <a:prstGeom prst="line">
+              <a:avLst/>
+            </a:prstGeom>
+            <a:ln>
+              <a:solidFill>
+                <a:schemeClr val="tx1"/>
+              </a:solidFill>
+            </a:ln>
+          </p:spPr>
+          <p:style>
+            <a:lnRef idx="1">
+              <a:schemeClr val="accent1"/>
+            </a:lnRef>
+            <a:fillRef idx="0">
+              <a:schemeClr val="accent1"/>
+            </a:fillRef>
+            <a:effectRef idx="0">
+              <a:schemeClr val="accent1"/>
+            </a:effectRef>
+            <a:fontRef idx="minor">
+              <a:schemeClr val="tx1"/>
+            </a:fontRef>
+          </p:style>
+        </p:cxnSp>
+        <p:sp>
+          <p:nvSpPr>
+            <p:cNvPr id="4" name="Rectangle 3">
+              <a:extLst>
+                <a:ext uri="{FF2B5EF4-FFF2-40B4-BE49-F238E27FC236}">
+                  <a16:creationId xmlns:a16="http://schemas.microsoft.com/office/drawing/2014/main" id="{0FA6609C-0EBB-98FB-61C2-FC18D5F434E8}"/>
+                </a:ext>
+              </a:extLst>
+            </p:cNvPr>
+            <p:cNvSpPr/>
+            <p:nvPr/>
+          </p:nvSpPr>
+          <p:spPr>
+            <a:xfrm>
+              <a:off x="672179" y="1155255"/>
+              <a:ext cx="6456282" cy="4583698"/>
+            </a:xfrm>
+            <a:prstGeom prst="rect">
+              <a:avLst/>
+            </a:prstGeom>
+            <a:noFill/>
+            <a:ln w="28575">
+              <a:solidFill>
+                <a:schemeClr val="tx1"/>
+              </a:solidFill>
+            </a:ln>
+          </p:spPr>
+          <p:style>
+            <a:lnRef idx="2">
+              <a:schemeClr val="accent1">
+                <a:shade val="50000"/>
+              </a:schemeClr>
+            </a:lnRef>
+            <a:fillRef idx="1">
+              <a:schemeClr val="accent1"/>
+            </a:fillRef>
+            <a:effectRef idx="0">
+              <a:schemeClr val="accent1"/>
+            </a:effectRef>
+            <a:fontRef idx="minor">
+              <a:schemeClr val="lt1"/>
+            </a:fontRef>
+          </p:style>
+          <p:txBody>
+            <a:bodyPr rtlCol="0" anchor="ctr"/>
+            <a:lstStyle/>
+            <a:p>
+              <a:pPr algn="ctr"/>
+              <a:endParaRPr lang="en-US">
+                <a:latin typeface="Arial" panose="020B0604020202020204" pitchFamily="34" charset="0"/>
+                <a:cs typeface="Arial" panose="020B0604020202020204" pitchFamily="34" charset="0"/>
+              </a:endParaRPr>
+            </a:p>
+          </p:txBody>
+        </p:sp>
+        <p:sp>
+          <p:nvSpPr>
+            <p:cNvPr id="6" name="TextBox 5">
+              <a:extLst>
+                <a:ext uri="{FF2B5EF4-FFF2-40B4-BE49-F238E27FC236}">
+                  <a16:creationId xmlns:a16="http://schemas.microsoft.com/office/drawing/2014/main" id="{5669CF25-B3CE-6501-1697-A47145FD5194}"/>
+                </a:ext>
+              </a:extLst>
+            </p:cNvPr>
+            <p:cNvSpPr txBox="1"/>
+            <p:nvPr/>
+          </p:nvSpPr>
+          <p:spPr>
+            <a:xfrm>
+              <a:off x="5254" y="4372853"/>
+              <a:ext cx="1417739" cy="369332"/>
+            </a:xfrm>
+            <a:prstGeom prst="rect">
+              <a:avLst/>
+            </a:prstGeom>
+            <a:solidFill>
+              <a:schemeClr val="bg1"/>
+            </a:solidFill>
+            <a:ln>
+              <a:noFill/>
+            </a:ln>
+          </p:spPr>
+          <p:txBody>
+            <a:bodyPr wrap="square" rtlCol="0">
+              <a:spAutoFit/>
+            </a:bodyPr>
+            <a:lstStyle/>
+            <a:p>
+              <a:r>
+                <a:rPr lang="en-US" dirty="0">
+                  <a:latin typeface="Arial" panose="020B0604020202020204" pitchFamily="34" charset="0"/>
+                  <a:cs typeface="Arial" panose="020B0604020202020204" pitchFamily="34" charset="0"/>
+                </a:rPr>
+                <a:t>North Twin</a:t>
+              </a:r>
+            </a:p>
+          </p:txBody>
+        </p:sp>
+        <p:sp>
+          <p:nvSpPr>
+            <p:cNvPr id="7" name="TextBox 6">
+              <a:extLst>
+                <a:ext uri="{FF2B5EF4-FFF2-40B4-BE49-F238E27FC236}">
+                  <a16:creationId xmlns:a16="http://schemas.microsoft.com/office/drawing/2014/main" id="{313746FE-EC7D-6B03-82BE-BA32ED227FC5}"/>
+                </a:ext>
+              </a:extLst>
+            </p:cNvPr>
+            <p:cNvSpPr txBox="1"/>
+            <p:nvPr/>
+          </p:nvSpPr>
+          <p:spPr>
+            <a:xfrm>
+              <a:off x="5254" y="5106599"/>
+              <a:ext cx="1417738" cy="369332"/>
+            </a:xfrm>
+            <a:prstGeom prst="rect">
+              <a:avLst/>
+            </a:prstGeom>
+            <a:solidFill>
+              <a:schemeClr val="bg1"/>
+            </a:solidFill>
+            <a:ln>
+              <a:noFill/>
+            </a:ln>
+          </p:spPr>
+          <p:txBody>
+            <a:bodyPr wrap="square" rtlCol="0">
+              <a:spAutoFit/>
+            </a:bodyPr>
+            <a:lstStyle/>
+            <a:p>
+              <a:pPr algn="ctr"/>
+              <a:r>
+                <a:rPr lang="en-US" dirty="0">
+                  <a:latin typeface="Arial" panose="020B0604020202020204" pitchFamily="34" charset="0"/>
+                  <a:cs typeface="Arial" panose="020B0604020202020204" pitchFamily="34" charset="0"/>
+                </a:rPr>
+                <a:t>Silver</a:t>
+              </a:r>
+            </a:p>
+          </p:txBody>
+        </p:sp>
+        <p:sp>
+          <p:nvSpPr>
+            <p:cNvPr id="8" name="TextBox 7">
+              <a:extLst>
+                <a:ext uri="{FF2B5EF4-FFF2-40B4-BE49-F238E27FC236}">
+                  <a16:creationId xmlns:a16="http://schemas.microsoft.com/office/drawing/2014/main" id="{6840C9A7-9E45-EA23-8C2C-65B092FFCE7D}"/>
+                </a:ext>
+              </a:extLst>
+            </p:cNvPr>
+            <p:cNvSpPr txBox="1"/>
+            <p:nvPr/>
+          </p:nvSpPr>
+          <p:spPr>
+            <a:xfrm>
+              <a:off x="-12639" y="2176707"/>
+              <a:ext cx="1417737" cy="369332"/>
+            </a:xfrm>
+            <a:prstGeom prst="rect">
+              <a:avLst/>
+            </a:prstGeom>
+            <a:solidFill>
+              <a:schemeClr val="bg1"/>
+            </a:solidFill>
+            <a:ln>
+              <a:noFill/>
+            </a:ln>
+          </p:spPr>
+          <p:txBody>
+            <a:bodyPr wrap="square" rtlCol="0">
+              <a:spAutoFit/>
+            </a:bodyPr>
+            <a:lstStyle/>
+            <a:p>
+              <a:pPr algn="ctr"/>
+              <a:r>
+                <a:rPr lang="en-US" dirty="0">
+                  <a:latin typeface="Arial" panose="020B0604020202020204" pitchFamily="34" charset="0"/>
+                  <a:cs typeface="Arial" panose="020B0604020202020204" pitchFamily="34" charset="0"/>
+                </a:rPr>
+                <a:t>South Twin</a:t>
+              </a:r>
+            </a:p>
+          </p:txBody>
+        </p:sp>
+        <p:sp>
+          <p:nvSpPr>
+            <p:cNvPr id="9" name="TextBox 8">
+              <a:extLst>
+                <a:ext uri="{FF2B5EF4-FFF2-40B4-BE49-F238E27FC236}">
+                  <a16:creationId xmlns:a16="http://schemas.microsoft.com/office/drawing/2014/main" id="{2C81AEA8-F6C6-EEDF-E971-01FC2745B0E8}"/>
+                </a:ext>
+              </a:extLst>
+            </p:cNvPr>
+            <p:cNvSpPr txBox="1"/>
+            <p:nvPr/>
+          </p:nvSpPr>
+          <p:spPr>
+            <a:xfrm>
+              <a:off x="-12640" y="1438023"/>
+              <a:ext cx="1417738" cy="369332"/>
+            </a:xfrm>
+            <a:prstGeom prst="rect">
+              <a:avLst/>
+            </a:prstGeom>
+            <a:solidFill>
+              <a:schemeClr val="bg1"/>
+            </a:solidFill>
+            <a:ln>
+              <a:noFill/>
+            </a:ln>
+          </p:spPr>
+          <p:txBody>
+            <a:bodyPr wrap="square" rtlCol="0">
+              <a:spAutoFit/>
+            </a:bodyPr>
+            <a:lstStyle/>
+            <a:p>
+              <a:pPr algn="ctr"/>
+              <a:r>
+                <a:rPr lang="en-US" dirty="0">
+                  <a:latin typeface="Arial" panose="020B0604020202020204" pitchFamily="34" charset="0"/>
+                  <a:cs typeface="Arial" panose="020B0604020202020204" pitchFamily="34" charset="0"/>
+                </a:rPr>
+                <a:t>Storm</a:t>
+              </a:r>
+            </a:p>
+          </p:txBody>
+        </p:sp>
+        <p:sp>
+          <p:nvSpPr>
+            <p:cNvPr id="34" name="TextBox 33">
+              <a:extLst>
+                <a:ext uri="{FF2B5EF4-FFF2-40B4-BE49-F238E27FC236}">
+                  <a16:creationId xmlns:a16="http://schemas.microsoft.com/office/drawing/2014/main" id="{2773415F-540D-F4DC-5863-D57D69D17281}"/>
+                </a:ext>
+              </a:extLst>
+            </p:cNvPr>
+            <p:cNvSpPr txBox="1"/>
+            <p:nvPr/>
+          </p:nvSpPr>
+          <p:spPr>
+            <a:xfrm>
+              <a:off x="2072022" y="953525"/>
+              <a:ext cx="1381687" cy="369332"/>
+            </a:xfrm>
+            <a:prstGeom prst="rect">
+              <a:avLst/>
+            </a:prstGeom>
+            <a:solidFill>
+              <a:schemeClr val="bg1"/>
+            </a:solidFill>
+          </p:spPr>
+          <p:txBody>
+            <a:bodyPr wrap="square" rtlCol="0">
+              <a:spAutoFit/>
+            </a:bodyPr>
+            <a:lstStyle/>
+            <a:p>
+              <a:r>
+                <a:rPr lang="en-US" dirty="0">
+                  <a:latin typeface="Arial" panose="020B0604020202020204" pitchFamily="34" charset="0"/>
+                  <a:cs typeface="Arial" panose="020B0604020202020204" pitchFamily="34" charset="0"/>
+                </a:rPr>
+                <a:t>Summer 18</a:t>
+              </a:r>
+            </a:p>
+          </p:txBody>
+        </p:sp>
+        <p:sp>
+          <p:nvSpPr>
+            <p:cNvPr id="35" name="TextBox 34">
+              <a:extLst>
+                <a:ext uri="{FF2B5EF4-FFF2-40B4-BE49-F238E27FC236}">
+                  <a16:creationId xmlns:a16="http://schemas.microsoft.com/office/drawing/2014/main" id="{BF43F00E-C941-4CE3-9596-36362D13FD7E}"/>
+                </a:ext>
+              </a:extLst>
+            </p:cNvPr>
+            <p:cNvSpPr txBox="1"/>
+            <p:nvPr/>
+          </p:nvSpPr>
+          <p:spPr>
+            <a:xfrm>
+              <a:off x="3814516" y="953525"/>
+              <a:ext cx="1378230" cy="369332"/>
+            </a:xfrm>
+            <a:prstGeom prst="rect">
+              <a:avLst/>
+            </a:prstGeom>
+            <a:solidFill>
+              <a:schemeClr val="bg1"/>
+            </a:solidFill>
+          </p:spPr>
+          <p:txBody>
+            <a:bodyPr wrap="square" rtlCol="0">
+              <a:spAutoFit/>
+            </a:bodyPr>
+            <a:lstStyle/>
+            <a:p>
+              <a:r>
+                <a:rPr lang="en-US" dirty="0">
+                  <a:latin typeface="Arial" panose="020B0604020202020204" pitchFamily="34" charset="0"/>
+                  <a:cs typeface="Arial" panose="020B0604020202020204" pitchFamily="34" charset="0"/>
+                </a:rPr>
+                <a:t>Summer 19</a:t>
+              </a:r>
+            </a:p>
+          </p:txBody>
+        </p:sp>
+        <p:sp>
+          <p:nvSpPr>
+            <p:cNvPr id="36" name="TextBox 35">
+              <a:extLst>
+                <a:ext uri="{FF2B5EF4-FFF2-40B4-BE49-F238E27FC236}">
+                  <a16:creationId xmlns:a16="http://schemas.microsoft.com/office/drawing/2014/main" id="{9DE93781-2FF7-87C1-5532-C46FF5140355}"/>
+                </a:ext>
+              </a:extLst>
+            </p:cNvPr>
+            <p:cNvSpPr txBox="1"/>
+            <p:nvPr/>
+          </p:nvSpPr>
+          <p:spPr>
+            <a:xfrm>
+              <a:off x="5609854" y="951868"/>
+              <a:ext cx="1378230" cy="369332"/>
+            </a:xfrm>
+            <a:prstGeom prst="rect">
+              <a:avLst/>
+            </a:prstGeom>
+            <a:solidFill>
+              <a:schemeClr val="bg1"/>
+            </a:solidFill>
+          </p:spPr>
+          <p:txBody>
+            <a:bodyPr wrap="square" rtlCol="0">
+              <a:spAutoFit/>
+            </a:bodyPr>
+            <a:lstStyle/>
+            <a:p>
+              <a:r>
+                <a:rPr lang="en-US" dirty="0">
+                  <a:latin typeface="Arial" panose="020B0604020202020204" pitchFamily="34" charset="0"/>
+                  <a:cs typeface="Arial" panose="020B0604020202020204" pitchFamily="34" charset="0"/>
+                </a:rPr>
+                <a:t>Summer 20</a:t>
+              </a:r>
+            </a:p>
+          </p:txBody>
+        </p:sp>
+        <p:sp>
+          <p:nvSpPr>
+            <p:cNvPr id="67" name="TextBox 66">
+              <a:extLst>
+                <a:ext uri="{FF2B5EF4-FFF2-40B4-BE49-F238E27FC236}">
+                  <a16:creationId xmlns:a16="http://schemas.microsoft.com/office/drawing/2014/main" id="{1AFC71B1-E890-491E-056A-1D168F34450A}"/>
+                </a:ext>
+              </a:extLst>
+            </p:cNvPr>
+            <p:cNvSpPr txBox="1"/>
+            <p:nvPr/>
+          </p:nvSpPr>
+          <p:spPr>
+            <a:xfrm>
+              <a:off x="5254" y="2849039"/>
+              <a:ext cx="1417737" cy="369332"/>
+            </a:xfrm>
+            <a:prstGeom prst="rect">
+              <a:avLst/>
+            </a:prstGeom>
+            <a:solidFill>
+              <a:schemeClr val="bg1"/>
+            </a:solidFill>
+            <a:ln>
+              <a:noFill/>
+            </a:ln>
+          </p:spPr>
+          <p:txBody>
+            <a:bodyPr wrap="square" rtlCol="0">
+              <a:spAutoFit/>
+            </a:bodyPr>
+            <a:lstStyle/>
+            <a:p>
+              <a:pPr algn="ctr"/>
+              <a:r>
+                <a:rPr lang="en-US" dirty="0">
+                  <a:latin typeface="Arial" panose="020B0604020202020204" pitchFamily="34" charset="0"/>
+                  <a:cs typeface="Arial" panose="020B0604020202020204" pitchFamily="34" charset="0"/>
+                </a:rPr>
+                <a:t>Center</a:t>
+              </a:r>
+            </a:p>
+          </p:txBody>
+        </p:sp>
+        <p:sp>
+          <p:nvSpPr>
+            <p:cNvPr id="68" name="TextBox 67">
+              <a:extLst>
+                <a:ext uri="{FF2B5EF4-FFF2-40B4-BE49-F238E27FC236}">
+                  <a16:creationId xmlns:a16="http://schemas.microsoft.com/office/drawing/2014/main" id="{63023FBE-42E4-97DE-EA65-D9A13F772A5B}"/>
+                </a:ext>
+              </a:extLst>
+            </p:cNvPr>
+            <p:cNvSpPr txBox="1"/>
+            <p:nvPr/>
+          </p:nvSpPr>
+          <p:spPr>
+            <a:xfrm>
+              <a:off x="0" y="3548899"/>
+              <a:ext cx="1417737" cy="369332"/>
+            </a:xfrm>
+            <a:prstGeom prst="rect">
+              <a:avLst/>
+            </a:prstGeom>
+            <a:solidFill>
+              <a:schemeClr val="bg1"/>
+            </a:solidFill>
+            <a:ln>
+              <a:noFill/>
+            </a:ln>
+          </p:spPr>
+          <p:txBody>
+            <a:bodyPr wrap="square" rtlCol="0">
+              <a:spAutoFit/>
+            </a:bodyPr>
+            <a:lstStyle/>
+            <a:p>
+              <a:pPr algn="ctr"/>
+              <a:r>
+                <a:rPr lang="en-US" dirty="0">
+                  <a:latin typeface="Arial" panose="020B0604020202020204" pitchFamily="34" charset="0"/>
+                  <a:cs typeface="Arial" panose="020B0604020202020204" pitchFamily="34" charset="0"/>
+                </a:rPr>
+                <a:t>Five Island</a:t>
+              </a:r>
+            </a:p>
+          </p:txBody>
+        </p:sp>
+        <p:sp>
+          <p:nvSpPr>
+            <p:cNvPr id="3" name="Rectangle 2">
+              <a:extLst>
+                <a:ext uri="{FF2B5EF4-FFF2-40B4-BE49-F238E27FC236}">
+                  <a16:creationId xmlns:a16="http://schemas.microsoft.com/office/drawing/2014/main" id="{6EE857AC-6EF5-8161-86A6-BBAA21DAF584}"/>
+                </a:ext>
+              </a:extLst>
+            </p:cNvPr>
+            <p:cNvSpPr/>
+            <p:nvPr/>
+          </p:nvSpPr>
+          <p:spPr>
+            <a:xfrm>
+              <a:off x="2688565" y="1357776"/>
+              <a:ext cx="151453" cy="4199536"/>
+            </a:xfrm>
+            <a:prstGeom prst="rect">
+              <a:avLst/>
+            </a:prstGeom>
+            <a:solidFill>
+              <a:schemeClr val="tx1">
+                <a:lumMod val="65000"/>
+                <a:lumOff val="35000"/>
+              </a:schemeClr>
+            </a:solidFill>
+            <a:ln w="28575">
+              <a:solidFill>
+                <a:schemeClr val="tx1"/>
+              </a:solidFill>
+            </a:ln>
+          </p:spPr>
+          <p:style>
+            <a:lnRef idx="2">
+              <a:schemeClr val="accent1">
+                <a:shade val="50000"/>
+              </a:schemeClr>
+            </a:lnRef>
+            <a:fillRef idx="1">
+              <a:schemeClr val="accent1"/>
+            </a:fillRef>
+            <a:effectRef idx="0">
+              <a:schemeClr val="accent1"/>
+            </a:effectRef>
+            <a:fontRef idx="minor">
+              <a:schemeClr val="lt1"/>
+            </a:fontRef>
+          </p:style>
+          <p:txBody>
+            <a:bodyPr rtlCol="0" anchor="ctr"/>
+            <a:lstStyle/>
+            <a:p>
+              <a:pPr algn="ctr"/>
+              <a:endParaRPr lang="en-US">
+                <a:latin typeface="Arial" panose="020B0604020202020204" pitchFamily="34" charset="0"/>
+                <a:cs typeface="Arial" panose="020B0604020202020204" pitchFamily="34" charset="0"/>
+              </a:endParaRPr>
+            </a:p>
+          </p:txBody>
+        </p:sp>
+        <p:sp>
+          <p:nvSpPr>
+            <p:cNvPr id="13" name="Oval 12">
+              <a:extLst>
+                <a:ext uri="{FF2B5EF4-FFF2-40B4-BE49-F238E27FC236}">
+                  <a16:creationId xmlns:a16="http://schemas.microsoft.com/office/drawing/2014/main" id="{6A60EF31-8728-BA71-19B8-DC89255DD341}"/>
+                </a:ext>
+              </a:extLst>
+            </p:cNvPr>
+            <p:cNvSpPr/>
+            <p:nvPr/>
+          </p:nvSpPr>
+          <p:spPr>
+            <a:xfrm>
+              <a:off x="3123502" y="2967222"/>
+              <a:ext cx="136465" cy="132964"/>
+            </a:xfrm>
+            <a:prstGeom prst="ellipse">
+              <a:avLst/>
+            </a:prstGeom>
+            <a:solidFill>
+              <a:srgbClr val="60B1FF"/>
+            </a:solidFill>
+            <a:ln>
+              <a:noFill/>
+            </a:ln>
+          </p:spPr>
+          <p:style>
+            <a:lnRef idx="2">
+              <a:schemeClr val="accent1">
+                <a:shade val="50000"/>
+              </a:schemeClr>
+            </a:lnRef>
+            <a:fillRef idx="1">
+              <a:schemeClr val="accent1"/>
+            </a:fillRef>
+            <a:effectRef idx="0">
+              <a:schemeClr val="accent1"/>
+            </a:effectRef>
+            <a:fontRef idx="minor">
+              <a:schemeClr val="lt1"/>
+            </a:fontRef>
+          </p:style>
+          <p:txBody>
+            <a:bodyPr rtlCol="0" anchor="ctr"/>
+            <a:lstStyle/>
+            <a:p>
+              <a:pPr algn="ctr"/>
+              <a:endParaRPr lang="en-US" dirty="0"/>
+            </a:p>
+          </p:txBody>
+        </p:sp>
+        <p:sp>
+          <p:nvSpPr>
+            <p:cNvPr id="14" name="Oval 13">
+              <a:extLst>
+                <a:ext uri="{FF2B5EF4-FFF2-40B4-BE49-F238E27FC236}">
+                  <a16:creationId xmlns:a16="http://schemas.microsoft.com/office/drawing/2014/main" id="{9609FC21-F8CE-DD4A-435D-81B38ED2892C}"/>
+                </a:ext>
+              </a:extLst>
+            </p:cNvPr>
+            <p:cNvSpPr/>
+            <p:nvPr/>
+          </p:nvSpPr>
+          <p:spPr>
+            <a:xfrm>
+              <a:off x="1624140" y="2902031"/>
+              <a:ext cx="256876" cy="263347"/>
+            </a:xfrm>
+            <a:prstGeom prst="ellipse">
+              <a:avLst/>
+            </a:prstGeom>
+            <a:solidFill>
+              <a:srgbClr val="60B1FF"/>
+            </a:solidFill>
+            <a:ln>
+              <a:noFill/>
+            </a:ln>
+          </p:spPr>
+          <p:style>
+            <a:lnRef idx="2">
+              <a:schemeClr val="accent1">
+                <a:shade val="50000"/>
+              </a:schemeClr>
+            </a:lnRef>
+            <a:fillRef idx="1">
+              <a:schemeClr val="accent1"/>
+            </a:fillRef>
+            <a:effectRef idx="0">
+              <a:schemeClr val="accent1"/>
+            </a:effectRef>
+            <a:fontRef idx="minor">
+              <a:schemeClr val="lt1"/>
+            </a:fontRef>
+          </p:style>
+          <p:txBody>
+            <a:bodyPr rtlCol="0" anchor="ctr"/>
+            <a:lstStyle/>
+            <a:p>
+              <a:pPr algn="ctr"/>
+              <a:endParaRPr lang="en-US" dirty="0"/>
+            </a:p>
+          </p:txBody>
+        </p:sp>
+        <p:sp>
+          <p:nvSpPr>
+            <p:cNvPr id="21" name="Oval 20">
+              <a:extLst>
+                <a:ext uri="{FF2B5EF4-FFF2-40B4-BE49-F238E27FC236}">
+                  <a16:creationId xmlns:a16="http://schemas.microsoft.com/office/drawing/2014/main" id="{4BD0B206-2A45-7629-AC1B-71EFB8092CB0}"/>
+                </a:ext>
+              </a:extLst>
+            </p:cNvPr>
+            <p:cNvSpPr/>
+            <p:nvPr/>
+          </p:nvSpPr>
+          <p:spPr>
+            <a:xfrm>
+              <a:off x="1668290" y="3647154"/>
+              <a:ext cx="168575" cy="172822"/>
+            </a:xfrm>
+            <a:prstGeom prst="ellipse">
+              <a:avLst/>
+            </a:prstGeom>
+            <a:solidFill>
+              <a:srgbClr val="60B1FF"/>
+            </a:solidFill>
+            <a:ln>
+              <a:noFill/>
+            </a:ln>
+          </p:spPr>
+          <p:style>
+            <a:lnRef idx="2">
+              <a:schemeClr val="accent1">
+                <a:shade val="50000"/>
+              </a:schemeClr>
+            </a:lnRef>
+            <a:fillRef idx="1">
+              <a:schemeClr val="accent1"/>
+            </a:fillRef>
+            <a:effectRef idx="0">
+              <a:schemeClr val="accent1"/>
+            </a:effectRef>
+            <a:fontRef idx="minor">
+              <a:schemeClr val="lt1"/>
+            </a:fontRef>
+          </p:style>
+          <p:txBody>
+            <a:bodyPr rtlCol="0" anchor="ctr"/>
+            <a:lstStyle/>
+            <a:p>
+              <a:pPr algn="ctr"/>
+              <a:endParaRPr lang="en-US" dirty="0"/>
+            </a:p>
+          </p:txBody>
+        </p:sp>
+        <p:sp>
+          <p:nvSpPr>
+            <p:cNvPr id="22" name="Oval 21">
+              <a:extLst>
+                <a:ext uri="{FF2B5EF4-FFF2-40B4-BE49-F238E27FC236}">
+                  <a16:creationId xmlns:a16="http://schemas.microsoft.com/office/drawing/2014/main" id="{8C1B816A-7C36-EA88-D289-353BCC2E61E2}"/>
+                </a:ext>
+              </a:extLst>
+            </p:cNvPr>
+            <p:cNvSpPr/>
+            <p:nvPr/>
+          </p:nvSpPr>
+          <p:spPr>
+            <a:xfrm>
+              <a:off x="3087687" y="3622465"/>
+              <a:ext cx="216739" cy="222199"/>
+            </a:xfrm>
+            <a:prstGeom prst="ellipse">
+              <a:avLst/>
+            </a:prstGeom>
+            <a:solidFill>
+              <a:srgbClr val="60B1FF"/>
+            </a:solidFill>
+            <a:ln>
+              <a:noFill/>
+            </a:ln>
+          </p:spPr>
+          <p:style>
+            <a:lnRef idx="2">
+              <a:schemeClr val="accent1">
+                <a:shade val="50000"/>
+              </a:schemeClr>
+            </a:lnRef>
+            <a:fillRef idx="1">
+              <a:schemeClr val="accent1"/>
+            </a:fillRef>
+            <a:effectRef idx="0">
+              <a:schemeClr val="accent1"/>
+            </a:effectRef>
+            <a:fontRef idx="minor">
+              <a:schemeClr val="lt1"/>
+            </a:fontRef>
+          </p:style>
+          <p:txBody>
+            <a:bodyPr rtlCol="0" anchor="ctr"/>
+            <a:lstStyle/>
+            <a:p>
+              <a:pPr algn="ctr"/>
+              <a:endParaRPr lang="en-US" dirty="0"/>
+            </a:p>
+          </p:txBody>
+        </p:sp>
+        <p:sp>
+          <p:nvSpPr>
+            <p:cNvPr id="23" name="Oval 22">
+              <a:extLst>
+                <a:ext uri="{FF2B5EF4-FFF2-40B4-BE49-F238E27FC236}">
+                  <a16:creationId xmlns:a16="http://schemas.microsoft.com/office/drawing/2014/main" id="{32A2F131-0E6E-652C-1DAD-A5D4430E2597}"/>
+                </a:ext>
+              </a:extLst>
+            </p:cNvPr>
+            <p:cNvSpPr/>
+            <p:nvPr/>
+          </p:nvSpPr>
+          <p:spPr>
+            <a:xfrm>
+              <a:off x="4978371" y="4492108"/>
+              <a:ext cx="144493" cy="148133"/>
+            </a:xfrm>
+            <a:prstGeom prst="ellipse">
+              <a:avLst/>
+            </a:prstGeom>
+            <a:solidFill>
+              <a:srgbClr val="60B1FF"/>
+            </a:solidFill>
+            <a:ln>
+              <a:noFill/>
+            </a:ln>
+          </p:spPr>
+          <p:style>
+            <a:lnRef idx="2">
+              <a:schemeClr val="accent1">
+                <a:shade val="50000"/>
+              </a:schemeClr>
+            </a:lnRef>
+            <a:fillRef idx="1">
+              <a:schemeClr val="accent1"/>
+            </a:fillRef>
+            <a:effectRef idx="0">
+              <a:schemeClr val="accent1"/>
+            </a:effectRef>
+            <a:fontRef idx="minor">
+              <a:schemeClr val="lt1"/>
+            </a:fontRef>
+          </p:style>
+          <p:txBody>
+            <a:bodyPr rtlCol="0" anchor="ctr"/>
+            <a:lstStyle/>
+            <a:p>
+              <a:pPr algn="ctr"/>
+              <a:endParaRPr lang="en-US" dirty="0"/>
+            </a:p>
+          </p:txBody>
+        </p:sp>
+        <p:sp>
+          <p:nvSpPr>
+            <p:cNvPr id="24" name="Oval 23">
+              <a:extLst>
+                <a:ext uri="{FF2B5EF4-FFF2-40B4-BE49-F238E27FC236}">
+                  <a16:creationId xmlns:a16="http://schemas.microsoft.com/office/drawing/2014/main" id="{5C584C5D-1665-EE75-CF64-908CEDD8EE72}"/>
+                </a:ext>
+              </a:extLst>
+            </p:cNvPr>
+            <p:cNvSpPr/>
+            <p:nvPr/>
+          </p:nvSpPr>
+          <p:spPr>
+            <a:xfrm>
+              <a:off x="3095405" y="4458763"/>
+              <a:ext cx="192657" cy="197510"/>
+            </a:xfrm>
+            <a:prstGeom prst="ellipse">
+              <a:avLst/>
+            </a:prstGeom>
+            <a:solidFill>
+              <a:srgbClr val="60B1FF"/>
+            </a:solidFill>
+            <a:ln>
+              <a:noFill/>
+            </a:ln>
+          </p:spPr>
+          <p:style>
+            <a:lnRef idx="2">
+              <a:schemeClr val="accent1">
+                <a:shade val="50000"/>
+              </a:schemeClr>
+            </a:lnRef>
+            <a:fillRef idx="1">
+              <a:schemeClr val="accent1"/>
+            </a:fillRef>
+            <a:effectRef idx="0">
+              <a:schemeClr val="accent1"/>
+            </a:effectRef>
+            <a:fontRef idx="minor">
+              <a:schemeClr val="lt1"/>
+            </a:fontRef>
+          </p:style>
+          <p:txBody>
+            <a:bodyPr rtlCol="0" anchor="ctr"/>
+            <a:lstStyle/>
+            <a:p>
+              <a:pPr algn="ctr"/>
+              <a:endParaRPr lang="en-US" dirty="0"/>
+            </a:p>
+          </p:txBody>
+        </p:sp>
+        <p:sp>
+          <p:nvSpPr>
+            <p:cNvPr id="25" name="Oval 24">
+              <a:extLst>
+                <a:ext uri="{FF2B5EF4-FFF2-40B4-BE49-F238E27FC236}">
+                  <a16:creationId xmlns:a16="http://schemas.microsoft.com/office/drawing/2014/main" id="{D14946E6-67C1-D0CA-06BD-D9EA4F70089E}"/>
+                </a:ext>
+              </a:extLst>
+            </p:cNvPr>
+            <p:cNvSpPr/>
+            <p:nvPr/>
+          </p:nvSpPr>
+          <p:spPr>
+            <a:xfrm>
+              <a:off x="3125820" y="5233658"/>
+              <a:ext cx="112383" cy="115214"/>
+            </a:xfrm>
+            <a:prstGeom prst="ellipse">
+              <a:avLst/>
+            </a:prstGeom>
+            <a:solidFill>
+              <a:srgbClr val="60B1FF"/>
+            </a:solidFill>
+            <a:ln>
+              <a:noFill/>
+            </a:ln>
+          </p:spPr>
+          <p:style>
+            <a:lnRef idx="2">
+              <a:schemeClr val="accent1">
+                <a:shade val="50000"/>
+              </a:schemeClr>
+            </a:lnRef>
+            <a:fillRef idx="1">
+              <a:schemeClr val="accent1"/>
+            </a:fillRef>
+            <a:effectRef idx="0">
+              <a:schemeClr val="accent1"/>
+            </a:effectRef>
+            <a:fontRef idx="minor">
+              <a:schemeClr val="lt1"/>
+            </a:fontRef>
+          </p:style>
+          <p:txBody>
+            <a:bodyPr rtlCol="0" anchor="ctr"/>
+            <a:lstStyle/>
+            <a:p>
+              <a:pPr algn="ctr"/>
+              <a:endParaRPr lang="en-US" dirty="0"/>
+            </a:p>
+          </p:txBody>
+        </p:sp>
+        <p:sp>
+          <p:nvSpPr>
+            <p:cNvPr id="26" name="Oval 25">
+              <a:extLst>
+                <a:ext uri="{FF2B5EF4-FFF2-40B4-BE49-F238E27FC236}">
+                  <a16:creationId xmlns:a16="http://schemas.microsoft.com/office/drawing/2014/main" id="{0EA7B2B3-49F4-0E7D-6AC4-010BBEEE4C11}"/>
+                </a:ext>
+              </a:extLst>
+            </p:cNvPr>
+            <p:cNvSpPr/>
+            <p:nvPr/>
+          </p:nvSpPr>
+          <p:spPr>
+            <a:xfrm>
+              <a:off x="4649895" y="4879785"/>
+              <a:ext cx="802737" cy="822960"/>
+            </a:xfrm>
+            <a:prstGeom prst="ellipse">
+              <a:avLst/>
+            </a:prstGeom>
+            <a:solidFill>
+              <a:srgbClr val="60B1FF"/>
+            </a:solidFill>
+            <a:ln>
+              <a:noFill/>
+            </a:ln>
+          </p:spPr>
+          <p:style>
+            <a:lnRef idx="2">
+              <a:schemeClr val="accent1">
+                <a:shade val="50000"/>
+              </a:schemeClr>
+            </a:lnRef>
+            <a:fillRef idx="1">
+              <a:schemeClr val="accent1"/>
+            </a:fillRef>
+            <a:effectRef idx="0">
+              <a:schemeClr val="accent1"/>
+            </a:effectRef>
+            <a:fontRef idx="minor">
+              <a:schemeClr val="lt1"/>
+            </a:fontRef>
+          </p:style>
+          <p:txBody>
+            <a:bodyPr rtlCol="0" anchor="ctr"/>
+            <a:lstStyle/>
+            <a:p>
+              <a:pPr algn="ctr"/>
+              <a:endParaRPr lang="en-US" dirty="0"/>
+            </a:p>
+          </p:txBody>
+        </p:sp>
+        <p:sp>
+          <p:nvSpPr>
+            <p:cNvPr id="38" name="Oval 37">
+              <a:extLst>
+                <a:ext uri="{FF2B5EF4-FFF2-40B4-BE49-F238E27FC236}">
+                  <a16:creationId xmlns:a16="http://schemas.microsoft.com/office/drawing/2014/main" id="{E5EB7B53-48B5-E259-93FA-94D8358C4752}"/>
+                </a:ext>
+              </a:extLst>
+            </p:cNvPr>
+            <p:cNvSpPr/>
+            <p:nvPr/>
+          </p:nvSpPr>
+          <p:spPr>
+            <a:xfrm>
+              <a:off x="3524385" y="4154695"/>
+              <a:ext cx="802737" cy="822960"/>
+            </a:xfrm>
+            <a:prstGeom prst="ellipse">
+              <a:avLst/>
+            </a:prstGeom>
+            <a:solidFill>
+              <a:srgbClr val="6BAD88"/>
+            </a:solidFill>
+            <a:ln>
+              <a:noFill/>
+            </a:ln>
+          </p:spPr>
+          <p:style>
+            <a:lnRef idx="2">
+              <a:schemeClr val="accent1">
+                <a:shade val="50000"/>
+              </a:schemeClr>
+            </a:lnRef>
+            <a:fillRef idx="1">
+              <a:schemeClr val="accent1"/>
+            </a:fillRef>
+            <a:effectRef idx="0">
+              <a:schemeClr val="accent1"/>
+            </a:effectRef>
+            <a:fontRef idx="minor">
+              <a:schemeClr val="lt1"/>
+            </a:fontRef>
+          </p:style>
+          <p:txBody>
+            <a:bodyPr rtlCol="0" anchor="ctr"/>
+            <a:lstStyle/>
+            <a:p>
+              <a:pPr algn="ctr"/>
+              <a:endParaRPr lang="en-US" dirty="0"/>
+            </a:p>
+          </p:txBody>
+        </p:sp>
+        <p:sp>
+          <p:nvSpPr>
+            <p:cNvPr id="41" name="Oval 40">
+              <a:extLst>
+                <a:ext uri="{FF2B5EF4-FFF2-40B4-BE49-F238E27FC236}">
+                  <a16:creationId xmlns:a16="http://schemas.microsoft.com/office/drawing/2014/main" id="{D5D7DDEF-F05E-FCA7-2C9C-349A376611B7}"/>
+                </a:ext>
+              </a:extLst>
+            </p:cNvPr>
+            <p:cNvSpPr/>
+            <p:nvPr/>
+          </p:nvSpPr>
+          <p:spPr>
+            <a:xfrm>
+              <a:off x="2076164" y="2783249"/>
+              <a:ext cx="489670" cy="502006"/>
+            </a:xfrm>
+            <a:prstGeom prst="ellipse">
+              <a:avLst/>
+            </a:prstGeom>
+            <a:solidFill>
+              <a:srgbClr val="6BAD88"/>
+            </a:solidFill>
+            <a:ln>
+              <a:noFill/>
+            </a:ln>
+          </p:spPr>
+          <p:style>
+            <a:lnRef idx="2">
+              <a:schemeClr val="accent1">
+                <a:shade val="50000"/>
+              </a:schemeClr>
+            </a:lnRef>
+            <a:fillRef idx="1">
+              <a:schemeClr val="accent1"/>
+            </a:fillRef>
+            <a:effectRef idx="0">
+              <a:schemeClr val="accent1"/>
+            </a:effectRef>
+            <a:fontRef idx="minor">
+              <a:schemeClr val="lt1"/>
+            </a:fontRef>
+          </p:style>
+          <p:txBody>
+            <a:bodyPr rtlCol="0" anchor="ctr"/>
+            <a:lstStyle/>
+            <a:p>
+              <a:pPr algn="ctr"/>
+              <a:endParaRPr lang="en-US" dirty="0"/>
+            </a:p>
+          </p:txBody>
+        </p:sp>
+        <p:sp>
+          <p:nvSpPr>
+            <p:cNvPr id="42" name="Oval 41">
+              <a:extLst>
+                <a:ext uri="{FF2B5EF4-FFF2-40B4-BE49-F238E27FC236}">
+                  <a16:creationId xmlns:a16="http://schemas.microsoft.com/office/drawing/2014/main" id="{3441B1B3-CD53-6FB8-E3C3-1EBF2FE9687D}"/>
+                </a:ext>
+              </a:extLst>
+            </p:cNvPr>
+            <p:cNvSpPr/>
+            <p:nvPr/>
+          </p:nvSpPr>
+          <p:spPr>
+            <a:xfrm>
+              <a:off x="3857520" y="2962733"/>
+              <a:ext cx="136465" cy="139903"/>
+            </a:xfrm>
+            <a:prstGeom prst="ellipse">
+              <a:avLst/>
+            </a:prstGeom>
+            <a:solidFill>
+              <a:srgbClr val="6BAD88"/>
+            </a:solidFill>
+            <a:ln>
+              <a:noFill/>
+            </a:ln>
+          </p:spPr>
+          <p:style>
+            <a:lnRef idx="2">
+              <a:schemeClr val="accent1">
+                <a:shade val="50000"/>
+              </a:schemeClr>
+            </a:lnRef>
+            <a:fillRef idx="1">
+              <a:schemeClr val="accent1"/>
+            </a:fillRef>
+            <a:effectRef idx="0">
+              <a:schemeClr val="accent1"/>
+            </a:effectRef>
+            <a:fontRef idx="minor">
+              <a:schemeClr val="lt1"/>
+            </a:fontRef>
+          </p:style>
+          <p:txBody>
+            <a:bodyPr rtlCol="0" anchor="ctr"/>
+            <a:lstStyle/>
+            <a:p>
+              <a:pPr algn="ctr"/>
+              <a:endParaRPr lang="en-US" dirty="0"/>
+            </a:p>
+          </p:txBody>
+        </p:sp>
+        <p:sp>
+          <p:nvSpPr>
+            <p:cNvPr id="43" name="Oval 42">
+              <a:extLst>
+                <a:ext uri="{FF2B5EF4-FFF2-40B4-BE49-F238E27FC236}">
+                  <a16:creationId xmlns:a16="http://schemas.microsoft.com/office/drawing/2014/main" id="{E92E229B-33DF-42C8-3647-93E355821D72}"/>
+                </a:ext>
+              </a:extLst>
+            </p:cNvPr>
+            <p:cNvSpPr/>
+            <p:nvPr/>
+          </p:nvSpPr>
+          <p:spPr>
+            <a:xfrm>
+              <a:off x="3730117" y="3511813"/>
+              <a:ext cx="409396" cy="419710"/>
+            </a:xfrm>
+            <a:prstGeom prst="ellipse">
+              <a:avLst/>
+            </a:prstGeom>
+            <a:solidFill>
+              <a:srgbClr val="6BAD88"/>
+            </a:solidFill>
+            <a:ln>
+              <a:noFill/>
+            </a:ln>
+          </p:spPr>
+          <p:style>
+            <a:lnRef idx="2">
+              <a:schemeClr val="accent1">
+                <a:shade val="50000"/>
+              </a:schemeClr>
+            </a:lnRef>
+            <a:fillRef idx="1">
+              <a:schemeClr val="accent1"/>
+            </a:fillRef>
+            <a:effectRef idx="0">
+              <a:schemeClr val="accent1"/>
+            </a:effectRef>
+            <a:fontRef idx="minor">
+              <a:schemeClr val="lt1"/>
+            </a:fontRef>
+          </p:style>
+          <p:txBody>
+            <a:bodyPr rtlCol="0" anchor="ctr"/>
+            <a:lstStyle/>
+            <a:p>
+              <a:pPr algn="ctr"/>
+              <a:endParaRPr lang="en-US" dirty="0"/>
+            </a:p>
+          </p:txBody>
+        </p:sp>
+        <p:sp>
+          <p:nvSpPr>
+            <p:cNvPr id="44" name="Oval 43">
+              <a:extLst>
+                <a:ext uri="{FF2B5EF4-FFF2-40B4-BE49-F238E27FC236}">
+                  <a16:creationId xmlns:a16="http://schemas.microsoft.com/office/drawing/2014/main" id="{58E0FA80-34BB-949D-B92D-C1F7439133C1}"/>
+                </a:ext>
+              </a:extLst>
+            </p:cNvPr>
+            <p:cNvSpPr/>
+            <p:nvPr/>
+          </p:nvSpPr>
+          <p:spPr>
+            <a:xfrm>
+              <a:off x="5455016" y="4233492"/>
+              <a:ext cx="610080" cy="625450"/>
+            </a:xfrm>
+            <a:prstGeom prst="ellipse">
+              <a:avLst/>
+            </a:prstGeom>
+            <a:solidFill>
+              <a:srgbClr val="6BAD88"/>
+            </a:solidFill>
+            <a:ln>
+              <a:noFill/>
+            </a:ln>
+          </p:spPr>
+          <p:style>
+            <a:lnRef idx="2">
+              <a:schemeClr val="accent1">
+                <a:shade val="50000"/>
+              </a:schemeClr>
+            </a:lnRef>
+            <a:fillRef idx="1">
+              <a:schemeClr val="accent1"/>
+            </a:fillRef>
+            <a:effectRef idx="0">
+              <a:schemeClr val="accent1"/>
+            </a:effectRef>
+            <a:fontRef idx="minor">
+              <a:schemeClr val="lt1"/>
+            </a:fontRef>
+          </p:style>
+          <p:txBody>
+            <a:bodyPr rtlCol="0" anchor="ctr"/>
+            <a:lstStyle/>
+            <a:p>
+              <a:pPr algn="ctr"/>
+              <a:endParaRPr lang="en-US" dirty="0"/>
+            </a:p>
+          </p:txBody>
+        </p:sp>
+        <p:sp>
+          <p:nvSpPr>
+            <p:cNvPr id="45" name="Oval 44">
+              <a:extLst>
+                <a:ext uri="{FF2B5EF4-FFF2-40B4-BE49-F238E27FC236}">
+                  <a16:creationId xmlns:a16="http://schemas.microsoft.com/office/drawing/2014/main" id="{51002088-49AD-2A31-2F76-FD56D1D31948}"/>
+                </a:ext>
+              </a:extLst>
+            </p:cNvPr>
+            <p:cNvSpPr/>
+            <p:nvPr/>
+          </p:nvSpPr>
+          <p:spPr>
+            <a:xfrm>
+              <a:off x="2290131" y="3729619"/>
+              <a:ext cx="32109" cy="36576"/>
+            </a:xfrm>
+            <a:prstGeom prst="ellipse">
+              <a:avLst/>
+            </a:prstGeom>
+            <a:solidFill>
+              <a:srgbClr val="6BAD88"/>
+            </a:solidFill>
+            <a:ln>
+              <a:noFill/>
+            </a:ln>
+          </p:spPr>
+          <p:style>
+            <a:lnRef idx="2">
+              <a:schemeClr val="accent1">
+                <a:shade val="50000"/>
+              </a:schemeClr>
+            </a:lnRef>
+            <a:fillRef idx="1">
+              <a:schemeClr val="accent1"/>
+            </a:fillRef>
+            <a:effectRef idx="0">
+              <a:schemeClr val="accent1"/>
+            </a:effectRef>
+            <a:fontRef idx="minor">
+              <a:schemeClr val="lt1"/>
+            </a:fontRef>
+          </p:style>
+          <p:txBody>
+            <a:bodyPr rtlCol="0" anchor="ctr"/>
+            <a:lstStyle/>
+            <a:p>
+              <a:pPr algn="ctr"/>
+              <a:endParaRPr lang="en-US" dirty="0"/>
+            </a:p>
+          </p:txBody>
+        </p:sp>
+        <p:sp>
+          <p:nvSpPr>
+            <p:cNvPr id="46" name="Oval 45">
+              <a:extLst>
+                <a:ext uri="{FF2B5EF4-FFF2-40B4-BE49-F238E27FC236}">
+                  <a16:creationId xmlns:a16="http://schemas.microsoft.com/office/drawing/2014/main" id="{97522145-3128-513E-E192-2C97DF58B8B2}"/>
+                </a:ext>
+              </a:extLst>
+            </p:cNvPr>
+            <p:cNvSpPr/>
+            <p:nvPr/>
+          </p:nvSpPr>
+          <p:spPr>
+            <a:xfrm>
+              <a:off x="3851179" y="5227614"/>
+              <a:ext cx="144493" cy="148133"/>
+            </a:xfrm>
+            <a:prstGeom prst="ellipse">
+              <a:avLst/>
+            </a:prstGeom>
+            <a:solidFill>
+              <a:srgbClr val="6BAD88"/>
+            </a:solidFill>
+            <a:ln>
+              <a:noFill/>
+            </a:ln>
+          </p:spPr>
+          <p:style>
+            <a:lnRef idx="2">
+              <a:schemeClr val="accent1">
+                <a:shade val="50000"/>
+              </a:schemeClr>
+            </a:lnRef>
+            <a:fillRef idx="1">
+              <a:schemeClr val="accent1"/>
+            </a:fillRef>
+            <a:effectRef idx="0">
+              <a:schemeClr val="accent1"/>
+            </a:effectRef>
+            <a:fontRef idx="minor">
+              <a:schemeClr val="lt1"/>
+            </a:fontRef>
+          </p:style>
+          <p:txBody>
+            <a:bodyPr rtlCol="0" anchor="ctr"/>
+            <a:lstStyle/>
+            <a:p>
+              <a:pPr algn="ctr"/>
+              <a:endParaRPr lang="en-US" dirty="0"/>
+            </a:p>
+          </p:txBody>
+        </p:sp>
+        <p:sp>
+          <p:nvSpPr>
+            <p:cNvPr id="47" name="Oval 46">
+              <a:extLst>
+                <a:ext uri="{FF2B5EF4-FFF2-40B4-BE49-F238E27FC236}">
+                  <a16:creationId xmlns:a16="http://schemas.microsoft.com/office/drawing/2014/main" id="{E087B207-12B2-BA32-2701-6A89E4D014EB}"/>
+                </a:ext>
+              </a:extLst>
+            </p:cNvPr>
+            <p:cNvSpPr/>
+            <p:nvPr/>
+          </p:nvSpPr>
+          <p:spPr>
+            <a:xfrm>
+              <a:off x="5678199" y="5219384"/>
+              <a:ext cx="160547" cy="164592"/>
+            </a:xfrm>
+            <a:prstGeom prst="ellipse">
+              <a:avLst/>
+            </a:prstGeom>
+            <a:solidFill>
+              <a:srgbClr val="6BAD88"/>
+            </a:solidFill>
+            <a:ln>
+              <a:noFill/>
+            </a:ln>
+          </p:spPr>
+          <p:style>
+            <a:lnRef idx="2">
+              <a:schemeClr val="accent1">
+                <a:shade val="50000"/>
+              </a:schemeClr>
+            </a:lnRef>
+            <a:fillRef idx="1">
+              <a:schemeClr val="accent1"/>
+            </a:fillRef>
+            <a:effectRef idx="0">
+              <a:schemeClr val="accent1"/>
+            </a:effectRef>
+            <a:fontRef idx="minor">
+              <a:schemeClr val="lt1"/>
+            </a:fontRef>
+          </p:style>
+          <p:txBody>
+            <a:bodyPr rtlCol="0" anchor="ctr"/>
+            <a:lstStyle/>
+            <a:p>
+              <a:pPr algn="ctr"/>
+              <a:endParaRPr lang="en-US" dirty="0"/>
+            </a:p>
+          </p:txBody>
+        </p:sp>
+        <p:sp>
+          <p:nvSpPr>
+            <p:cNvPr id="79" name="Rectangle 78">
+              <a:extLst>
+                <a:ext uri="{FF2B5EF4-FFF2-40B4-BE49-F238E27FC236}">
+                  <a16:creationId xmlns:a16="http://schemas.microsoft.com/office/drawing/2014/main" id="{47F2ADC7-DA77-CFE5-CA80-C0D0FF17996F}"/>
+                </a:ext>
+              </a:extLst>
+            </p:cNvPr>
+            <p:cNvSpPr/>
+            <p:nvPr/>
+          </p:nvSpPr>
+          <p:spPr>
+            <a:xfrm>
+              <a:off x="4372220" y="1358884"/>
+              <a:ext cx="151453" cy="4199536"/>
+            </a:xfrm>
+            <a:prstGeom prst="rect">
+              <a:avLst/>
+            </a:prstGeom>
+            <a:solidFill>
+              <a:schemeClr val="tx1">
+                <a:lumMod val="65000"/>
+                <a:lumOff val="35000"/>
+              </a:schemeClr>
+            </a:solidFill>
+            <a:ln w="28575">
+              <a:solidFill>
+                <a:schemeClr val="tx1"/>
+              </a:solidFill>
+            </a:ln>
+          </p:spPr>
+          <p:style>
+            <a:lnRef idx="2">
+              <a:schemeClr val="accent1">
+                <a:shade val="50000"/>
+              </a:schemeClr>
+            </a:lnRef>
+            <a:fillRef idx="1">
+              <a:schemeClr val="accent1"/>
+            </a:fillRef>
+            <a:effectRef idx="0">
+              <a:schemeClr val="accent1"/>
+            </a:effectRef>
+            <a:fontRef idx="minor">
+              <a:schemeClr val="lt1"/>
+            </a:fontRef>
+          </p:style>
+          <p:txBody>
+            <a:bodyPr rtlCol="0" anchor="ctr"/>
+            <a:lstStyle/>
+            <a:p>
+              <a:pPr algn="ctr"/>
+              <a:endParaRPr lang="en-US">
+                <a:latin typeface="Arial" panose="020B0604020202020204" pitchFamily="34" charset="0"/>
+                <a:cs typeface="Arial" panose="020B0604020202020204" pitchFamily="34" charset="0"/>
+              </a:endParaRPr>
+            </a:p>
+          </p:txBody>
+        </p:sp>
+        <p:sp>
+          <p:nvSpPr>
+            <p:cNvPr id="80" name="Rectangle 79">
+              <a:extLst>
+                <a:ext uri="{FF2B5EF4-FFF2-40B4-BE49-F238E27FC236}">
+                  <a16:creationId xmlns:a16="http://schemas.microsoft.com/office/drawing/2014/main" id="{44FD5D37-3EB0-037B-C42C-1CD574DB9700}"/>
+                </a:ext>
+              </a:extLst>
+            </p:cNvPr>
+            <p:cNvSpPr/>
+            <p:nvPr/>
+          </p:nvSpPr>
+          <p:spPr>
+            <a:xfrm>
+              <a:off x="6171967" y="1357775"/>
+              <a:ext cx="151453" cy="4199536"/>
+            </a:xfrm>
+            <a:prstGeom prst="rect">
+              <a:avLst/>
+            </a:prstGeom>
+            <a:solidFill>
+              <a:schemeClr val="tx1">
+                <a:lumMod val="65000"/>
+                <a:lumOff val="35000"/>
+              </a:schemeClr>
+            </a:solidFill>
+            <a:ln w="28575">
+              <a:solidFill>
+                <a:schemeClr val="tx1"/>
+              </a:solidFill>
+            </a:ln>
+          </p:spPr>
+          <p:style>
+            <a:lnRef idx="2">
+              <a:schemeClr val="accent1">
+                <a:shade val="50000"/>
+              </a:schemeClr>
+            </a:lnRef>
+            <a:fillRef idx="1">
+              <a:schemeClr val="accent1"/>
+            </a:fillRef>
+            <a:effectRef idx="0">
+              <a:schemeClr val="accent1"/>
+            </a:effectRef>
+            <a:fontRef idx="minor">
+              <a:schemeClr val="lt1"/>
+            </a:fontRef>
+          </p:style>
+          <p:txBody>
+            <a:bodyPr rtlCol="0" anchor="ctr"/>
+            <a:lstStyle/>
+            <a:p>
+              <a:pPr algn="ctr"/>
+              <a:endParaRPr lang="en-US">
+                <a:latin typeface="Arial" panose="020B0604020202020204" pitchFamily="34" charset="0"/>
+                <a:cs typeface="Arial" panose="020B0604020202020204" pitchFamily="34" charset="0"/>
+              </a:endParaRPr>
+            </a:p>
+          </p:txBody>
+        </p:sp>
+        <p:grpSp>
+          <p:nvGrpSpPr>
+            <p:cNvPr id="2" name="Group 1">
+              <a:extLst>
+                <a:ext uri="{FF2B5EF4-FFF2-40B4-BE49-F238E27FC236}">
+                  <a16:creationId xmlns:a16="http://schemas.microsoft.com/office/drawing/2014/main" id="{5B1475E9-9E3C-C0FE-C412-2615AFC07DE1}"/>
+                </a:ext>
+              </a:extLst>
+            </p:cNvPr>
+            <p:cNvGrpSpPr/>
+            <p:nvPr/>
+          </p:nvGrpSpPr>
+          <p:grpSpPr>
+            <a:xfrm>
+              <a:off x="7195449" y="2487688"/>
+              <a:ext cx="2779624" cy="3251265"/>
+              <a:chOff x="7208506" y="2540126"/>
+              <a:chExt cx="2779624" cy="3251265"/>
+            </a:xfrm>
+          </p:grpSpPr>
+          <p:grpSp>
+            <p:nvGrpSpPr>
+              <p:cNvPr id="10" name="Group 9">
+                <a:extLst>
+                  <a:ext uri="{FF2B5EF4-FFF2-40B4-BE49-F238E27FC236}">
+                    <a16:creationId xmlns:a16="http://schemas.microsoft.com/office/drawing/2014/main" id="{D641FAF7-FED3-07B7-AB32-3BFC8FD13578}"/>
+                  </a:ext>
+                </a:extLst>
+              </p:cNvPr>
+              <p:cNvGrpSpPr/>
+              <p:nvPr/>
+            </p:nvGrpSpPr>
+            <p:grpSpPr>
+              <a:xfrm>
+                <a:off x="7383848" y="2849039"/>
+                <a:ext cx="2423131" cy="2942352"/>
+                <a:chOff x="7153914" y="2790535"/>
+                <a:chExt cx="2423131" cy="2942352"/>
+              </a:xfrm>
+            </p:grpSpPr>
+            <p:sp>
+              <p:nvSpPr>
+                <p:cNvPr id="12" name="Oval 11">
+                  <a:extLst>
+                    <a:ext uri="{FF2B5EF4-FFF2-40B4-BE49-F238E27FC236}">
+                      <a16:creationId xmlns:a16="http://schemas.microsoft.com/office/drawing/2014/main" id="{E73BAAFB-B806-14AC-1F30-E212B04808B9}"/>
+                    </a:ext>
+                  </a:extLst>
+                </p:cNvPr>
+                <p:cNvSpPr/>
+                <p:nvPr/>
+              </p:nvSpPr>
+              <p:spPr>
+                <a:xfrm>
+                  <a:off x="8284820" y="3441391"/>
+                  <a:ext cx="874983" cy="897026"/>
+                </a:xfrm>
+                <a:prstGeom prst="ellipse">
+                  <a:avLst/>
+                </a:prstGeom>
+                <a:solidFill>
+                  <a:srgbClr val="6BAD88"/>
+                </a:solidFill>
+                <a:ln>
+                  <a:noFill/>
+                </a:ln>
+              </p:spPr>
+              <p:style>
+                <a:lnRef idx="2">
+                  <a:schemeClr val="accent1">
+                    <a:shade val="50000"/>
+                  </a:schemeClr>
+                </a:lnRef>
+                <a:fillRef idx="1">
+                  <a:schemeClr val="accent1"/>
+                </a:fillRef>
+                <a:effectRef idx="0">
+                  <a:schemeClr val="accent1"/>
+                </a:effectRef>
+                <a:fontRef idx="minor">
+                  <a:schemeClr val="lt1"/>
+                </a:fontRef>
+              </p:style>
+              <p:txBody>
+                <a:bodyPr rtlCol="0" anchor="ctr"/>
+                <a:lstStyle/>
+                <a:p>
+                  <a:pPr algn="ctr"/>
+                  <a:r>
+                    <a:rPr lang="en-US" dirty="0"/>
+                    <a:t>375</a:t>
+                  </a:r>
+                </a:p>
+              </p:txBody>
+            </p:sp>
+            <p:sp>
+              <p:nvSpPr>
+                <p:cNvPr id="15" name="Oval 14">
+                  <a:extLst>
+                    <a:ext uri="{FF2B5EF4-FFF2-40B4-BE49-F238E27FC236}">
+                      <a16:creationId xmlns:a16="http://schemas.microsoft.com/office/drawing/2014/main" id="{B63B1628-18C6-638C-90B0-4E12D4D9F3CB}"/>
+                    </a:ext>
+                  </a:extLst>
+                </p:cNvPr>
+                <p:cNvSpPr/>
+                <p:nvPr/>
+              </p:nvSpPr>
+              <p:spPr>
+                <a:xfrm>
+                  <a:off x="7315986" y="3441391"/>
+                  <a:ext cx="850901" cy="872338"/>
+                </a:xfrm>
+                <a:prstGeom prst="ellipse">
+                  <a:avLst/>
+                </a:prstGeom>
+                <a:solidFill>
+                  <a:srgbClr val="60B1FF"/>
+                </a:solidFill>
+                <a:ln>
+                  <a:noFill/>
+                </a:ln>
+              </p:spPr>
+              <p:style>
+                <a:lnRef idx="2">
+                  <a:schemeClr val="accent1">
+                    <a:shade val="50000"/>
+                  </a:schemeClr>
+                </a:lnRef>
+                <a:fillRef idx="1">
+                  <a:schemeClr val="accent1"/>
+                </a:fillRef>
+                <a:effectRef idx="0">
+                  <a:schemeClr val="accent1"/>
+                </a:effectRef>
+                <a:fontRef idx="minor">
+                  <a:schemeClr val="lt1"/>
+                </a:fontRef>
+              </p:style>
+              <p:txBody>
+                <a:bodyPr rtlCol="0" anchor="ctr"/>
+                <a:lstStyle/>
+                <a:p>
+                  <a:pPr algn="ctr"/>
+                  <a:r>
+                    <a:rPr lang="en-US" dirty="0"/>
+                    <a:t>75</a:t>
+                  </a:r>
+                </a:p>
+              </p:txBody>
+            </p:sp>
+            <p:sp>
+              <p:nvSpPr>
+                <p:cNvPr id="16" name="Oval 15">
+                  <a:extLst>
+                    <a:ext uri="{FF2B5EF4-FFF2-40B4-BE49-F238E27FC236}">
+                      <a16:creationId xmlns:a16="http://schemas.microsoft.com/office/drawing/2014/main" id="{D1D85420-425A-4574-9C70-D9D5A49A5C4B}"/>
+                    </a:ext>
+                  </a:extLst>
+                </p:cNvPr>
+                <p:cNvSpPr/>
+                <p:nvPr/>
+              </p:nvSpPr>
+              <p:spPr>
+                <a:xfrm>
+                  <a:off x="7460720" y="4400484"/>
+                  <a:ext cx="561916" cy="576072"/>
+                </a:xfrm>
+                <a:prstGeom prst="ellipse">
+                  <a:avLst/>
+                </a:prstGeom>
+                <a:solidFill>
+                  <a:srgbClr val="60B1FF"/>
+                </a:solidFill>
+                <a:ln>
+                  <a:noFill/>
+                </a:ln>
+              </p:spPr>
+              <p:style>
+                <a:lnRef idx="2">
+                  <a:schemeClr val="accent1">
+                    <a:shade val="50000"/>
+                  </a:schemeClr>
+                </a:lnRef>
+                <a:fillRef idx="1">
+                  <a:schemeClr val="accent1"/>
+                </a:fillRef>
+                <a:effectRef idx="0">
+                  <a:schemeClr val="accent1"/>
+                </a:effectRef>
+                <a:fontRef idx="minor">
+                  <a:schemeClr val="lt1"/>
+                </a:fontRef>
+              </p:style>
+              <p:txBody>
+                <a:bodyPr rtlCol="0" anchor="ctr"/>
+                <a:lstStyle/>
+                <a:p>
+                  <a:pPr algn="ctr"/>
+                  <a:r>
+                    <a:rPr lang="en-US" sz="1600" dirty="0"/>
+                    <a:t>50</a:t>
+                  </a:r>
+                </a:p>
+              </p:txBody>
+            </p:sp>
+            <p:sp>
+              <p:nvSpPr>
+                <p:cNvPr id="17" name="Oval 16">
+                  <a:extLst>
+                    <a:ext uri="{FF2B5EF4-FFF2-40B4-BE49-F238E27FC236}">
+                      <a16:creationId xmlns:a16="http://schemas.microsoft.com/office/drawing/2014/main" id="{67C53822-37CD-55BE-43E4-EF2A29373124}"/>
+                    </a:ext>
+                  </a:extLst>
+                </p:cNvPr>
+                <p:cNvSpPr/>
+                <p:nvPr/>
+              </p:nvSpPr>
+              <p:spPr>
+                <a:xfrm>
+                  <a:off x="7582232" y="5062095"/>
+                  <a:ext cx="297815" cy="305318"/>
+                </a:xfrm>
+                <a:prstGeom prst="ellipse">
+                  <a:avLst/>
+                </a:prstGeom>
+                <a:solidFill>
+                  <a:srgbClr val="60B1FF"/>
+                </a:solidFill>
+                <a:ln>
+                  <a:noFill/>
+                </a:ln>
+              </p:spPr>
+              <p:style>
+                <a:lnRef idx="2">
+                  <a:schemeClr val="accent1">
+                    <a:shade val="50000"/>
+                  </a:schemeClr>
+                </a:lnRef>
+                <a:fillRef idx="1">
+                  <a:schemeClr val="accent1"/>
+                </a:fillRef>
+                <a:effectRef idx="0">
+                  <a:schemeClr val="accent1"/>
+                </a:effectRef>
+                <a:fontRef idx="minor">
+                  <a:schemeClr val="lt1"/>
+                </a:fontRef>
+              </p:style>
+              <p:txBody>
+                <a:bodyPr rtlCol="0" anchor="ctr"/>
+                <a:lstStyle/>
+                <a:p>
+                  <a:pPr algn="ctr"/>
+                  <a:endParaRPr lang="en-US" dirty="0"/>
+                </a:p>
+              </p:txBody>
+            </p:sp>
+            <p:sp>
+              <p:nvSpPr>
+                <p:cNvPr id="18" name="TextBox 17">
+                  <a:extLst>
+                    <a:ext uri="{FF2B5EF4-FFF2-40B4-BE49-F238E27FC236}">
+                      <a16:creationId xmlns:a16="http://schemas.microsoft.com/office/drawing/2014/main" id="{9396EB5D-F764-2DC3-CB43-C6C641427EC8}"/>
+                    </a:ext>
+                  </a:extLst>
+                </p:cNvPr>
+                <p:cNvSpPr txBox="1"/>
+                <p:nvPr/>
+              </p:nvSpPr>
+              <p:spPr>
+                <a:xfrm>
+                  <a:off x="7186440" y="5026619"/>
+                  <a:ext cx="415932" cy="369332"/>
+                </a:xfrm>
+                <a:prstGeom prst="rect">
+                  <a:avLst/>
+                </a:prstGeom>
+                <a:noFill/>
+              </p:spPr>
+              <p:txBody>
+                <a:bodyPr wrap="square" rtlCol="0">
+                  <a:spAutoFit/>
+                </a:bodyPr>
+                <a:lstStyle/>
+                <a:p>
+                  <a:r>
+                    <a:rPr lang="en-US" dirty="0"/>
+                    <a:t>25</a:t>
+                  </a:r>
+                </a:p>
+              </p:txBody>
+            </p:sp>
+            <p:sp>
+              <p:nvSpPr>
+                <p:cNvPr id="19" name="Oval 18">
+                  <a:extLst>
+                    <a:ext uri="{FF2B5EF4-FFF2-40B4-BE49-F238E27FC236}">
+                      <a16:creationId xmlns:a16="http://schemas.microsoft.com/office/drawing/2014/main" id="{0B5F6CF8-92FA-0056-09D8-2BD893E1FD2E}"/>
+                    </a:ext>
+                  </a:extLst>
+                </p:cNvPr>
+                <p:cNvSpPr/>
+                <p:nvPr/>
+              </p:nvSpPr>
+              <p:spPr>
+                <a:xfrm>
+                  <a:off x="7680998" y="5498807"/>
+                  <a:ext cx="85090" cy="87234"/>
+                </a:xfrm>
+                <a:prstGeom prst="ellipse">
+                  <a:avLst/>
+                </a:prstGeom>
+                <a:solidFill>
+                  <a:srgbClr val="60B1FF"/>
+                </a:solidFill>
+                <a:ln>
+                  <a:noFill/>
+                </a:ln>
+              </p:spPr>
+              <p:style>
+                <a:lnRef idx="2">
+                  <a:schemeClr val="accent1">
+                    <a:shade val="50000"/>
+                  </a:schemeClr>
+                </a:lnRef>
+                <a:fillRef idx="1">
+                  <a:schemeClr val="accent1"/>
+                </a:fillRef>
+                <a:effectRef idx="0">
+                  <a:schemeClr val="accent1"/>
+                </a:effectRef>
+                <a:fontRef idx="minor">
+                  <a:schemeClr val="lt1"/>
+                </a:fontRef>
+              </p:style>
+              <p:txBody>
+                <a:bodyPr rtlCol="0" anchor="ctr"/>
+                <a:lstStyle/>
+                <a:p>
+                  <a:pPr algn="ctr"/>
+                  <a:endParaRPr lang="en-US" dirty="0"/>
+                </a:p>
+              </p:txBody>
+            </p:sp>
+            <p:sp>
+              <p:nvSpPr>
+                <p:cNvPr id="20" name="TextBox 19">
+                  <a:extLst>
+                    <a:ext uri="{FF2B5EF4-FFF2-40B4-BE49-F238E27FC236}">
+                      <a16:creationId xmlns:a16="http://schemas.microsoft.com/office/drawing/2014/main" id="{56A937FE-ACF8-77AE-8840-64A3A6B21573}"/>
+                    </a:ext>
+                  </a:extLst>
+                </p:cNvPr>
+                <p:cNvSpPr txBox="1"/>
+                <p:nvPr/>
+              </p:nvSpPr>
+              <p:spPr>
+                <a:xfrm>
+                  <a:off x="7170879" y="5354309"/>
+                  <a:ext cx="415932" cy="369332"/>
+                </a:xfrm>
+                <a:prstGeom prst="rect">
+                  <a:avLst/>
+                </a:prstGeom>
+                <a:noFill/>
+              </p:spPr>
+              <p:txBody>
+                <a:bodyPr wrap="square" rtlCol="0">
+                  <a:spAutoFit/>
+                </a:bodyPr>
+                <a:lstStyle/>
+                <a:p>
+                  <a:r>
+                    <a:rPr lang="en-US" dirty="0"/>
+                    <a:t>10</a:t>
+                  </a:r>
+                </a:p>
+              </p:txBody>
+            </p:sp>
+            <p:sp>
+              <p:nvSpPr>
+                <p:cNvPr id="32" name="Oval 31">
+                  <a:extLst>
+                    <a:ext uri="{FF2B5EF4-FFF2-40B4-BE49-F238E27FC236}">
+                      <a16:creationId xmlns:a16="http://schemas.microsoft.com/office/drawing/2014/main" id="{7A14BA37-CC72-2728-5D22-1AB57E1A334B}"/>
+                    </a:ext>
+                  </a:extLst>
+                </p:cNvPr>
+                <p:cNvSpPr/>
+                <p:nvPr/>
+              </p:nvSpPr>
+              <p:spPr>
+                <a:xfrm>
+                  <a:off x="8421284" y="4379910"/>
+                  <a:ext cx="602053" cy="617220"/>
+                </a:xfrm>
+                <a:prstGeom prst="ellipse">
+                  <a:avLst/>
+                </a:prstGeom>
+                <a:solidFill>
+                  <a:srgbClr val="6BAD88"/>
+                </a:solidFill>
+                <a:ln>
+                  <a:noFill/>
+                </a:ln>
+              </p:spPr>
+              <p:style>
+                <a:lnRef idx="2">
+                  <a:schemeClr val="accent1">
+                    <a:shade val="50000"/>
+                  </a:schemeClr>
+                </a:lnRef>
+                <a:fillRef idx="1">
+                  <a:schemeClr val="accent1"/>
+                </a:fillRef>
+                <a:effectRef idx="0">
+                  <a:schemeClr val="accent1"/>
+                </a:effectRef>
+                <a:fontRef idx="minor">
+                  <a:schemeClr val="lt1"/>
+                </a:fontRef>
+              </p:style>
+              <p:txBody>
+                <a:bodyPr rtlCol="0" anchor="ctr"/>
+                <a:lstStyle/>
+                <a:p>
+                  <a:pPr algn="ctr"/>
+                  <a:endParaRPr lang="en-US" sz="1400" dirty="0"/>
+                </a:p>
+              </p:txBody>
+            </p:sp>
+            <p:sp>
+              <p:nvSpPr>
+                <p:cNvPr id="40" name="TextBox 39">
+                  <a:extLst>
+                    <a:ext uri="{FF2B5EF4-FFF2-40B4-BE49-F238E27FC236}">
+                      <a16:creationId xmlns:a16="http://schemas.microsoft.com/office/drawing/2014/main" id="{5FB0D4B4-363E-A309-27A8-0CCF4B37E332}"/>
+                    </a:ext>
+                  </a:extLst>
+                </p:cNvPr>
+                <p:cNvSpPr txBox="1"/>
+                <p:nvPr/>
+              </p:nvSpPr>
+              <p:spPr>
+                <a:xfrm>
+                  <a:off x="8977075" y="4520751"/>
+                  <a:ext cx="599970" cy="369332"/>
+                </a:xfrm>
+                <a:prstGeom prst="rect">
+                  <a:avLst/>
+                </a:prstGeom>
+                <a:noFill/>
+              </p:spPr>
+              <p:txBody>
+                <a:bodyPr wrap="square" rtlCol="0">
+                  <a:spAutoFit/>
+                </a:bodyPr>
+                <a:lstStyle/>
+                <a:p>
+                  <a:r>
+                    <a:rPr lang="en-US" dirty="0"/>
+                    <a:t>275</a:t>
+                  </a:r>
+                </a:p>
+              </p:txBody>
+            </p:sp>
+            <p:sp>
+              <p:nvSpPr>
+                <p:cNvPr id="52" name="Oval 51">
+                  <a:extLst>
+                    <a:ext uri="{FF2B5EF4-FFF2-40B4-BE49-F238E27FC236}">
+                      <a16:creationId xmlns:a16="http://schemas.microsoft.com/office/drawing/2014/main" id="{0BCB127B-FC2C-1EE1-ADFF-B5EBD3142695}"/>
+                    </a:ext>
+                  </a:extLst>
+                </p:cNvPr>
+                <p:cNvSpPr/>
+                <p:nvPr/>
+              </p:nvSpPr>
+              <p:spPr>
+                <a:xfrm>
+                  <a:off x="8611108" y="5131064"/>
+                  <a:ext cx="216739" cy="222199"/>
+                </a:xfrm>
+                <a:prstGeom prst="ellipse">
+                  <a:avLst/>
+                </a:prstGeom>
+                <a:solidFill>
+                  <a:srgbClr val="6BAD88"/>
+                </a:solidFill>
+                <a:ln>
+                  <a:noFill/>
+                </a:ln>
+              </p:spPr>
+              <p:style>
+                <a:lnRef idx="2">
+                  <a:schemeClr val="accent1">
+                    <a:shade val="50000"/>
+                  </a:schemeClr>
+                </a:lnRef>
+                <a:fillRef idx="1">
+                  <a:schemeClr val="accent1"/>
+                </a:fillRef>
+                <a:effectRef idx="0">
+                  <a:schemeClr val="accent1"/>
+                </a:effectRef>
+                <a:fontRef idx="minor">
+                  <a:schemeClr val="lt1"/>
+                </a:fontRef>
+              </p:style>
+              <p:txBody>
+                <a:bodyPr rtlCol="0" anchor="ctr"/>
+                <a:lstStyle/>
+                <a:p>
+                  <a:pPr algn="ctr"/>
+                  <a:endParaRPr lang="en-US" sz="1400" dirty="0"/>
+                </a:p>
+              </p:txBody>
+            </p:sp>
+            <p:sp>
+              <p:nvSpPr>
+                <p:cNvPr id="56" name="TextBox 55">
+                  <a:extLst>
+                    <a:ext uri="{FF2B5EF4-FFF2-40B4-BE49-F238E27FC236}">
+                      <a16:creationId xmlns:a16="http://schemas.microsoft.com/office/drawing/2014/main" id="{0162AAC7-0225-30D8-4FFF-BE2C84A49BD2}"/>
+                    </a:ext>
+                  </a:extLst>
+                </p:cNvPr>
+                <p:cNvSpPr txBox="1"/>
+                <p:nvPr/>
+              </p:nvSpPr>
+              <p:spPr>
+                <a:xfrm>
+                  <a:off x="8977075" y="5036544"/>
+                  <a:ext cx="599970" cy="369332"/>
+                </a:xfrm>
+                <a:prstGeom prst="rect">
+                  <a:avLst/>
+                </a:prstGeom>
+                <a:noFill/>
+              </p:spPr>
+              <p:txBody>
+                <a:bodyPr wrap="square" rtlCol="0">
+                  <a:spAutoFit/>
+                </a:bodyPr>
+                <a:lstStyle/>
+                <a:p>
+                  <a:r>
+                    <a:rPr lang="en-US" dirty="0"/>
+                    <a:t>100</a:t>
+                  </a:r>
+                </a:p>
+              </p:txBody>
+            </p:sp>
+            <p:sp>
+              <p:nvSpPr>
+                <p:cNvPr id="59" name="Oval 58">
+                  <a:extLst>
+                    <a:ext uri="{FF2B5EF4-FFF2-40B4-BE49-F238E27FC236}">
+                      <a16:creationId xmlns:a16="http://schemas.microsoft.com/office/drawing/2014/main" id="{F0A19420-AAE4-1DC5-2109-308781F909E6}"/>
+                    </a:ext>
+                  </a:extLst>
+                </p:cNvPr>
+                <p:cNvSpPr/>
+                <p:nvPr/>
+              </p:nvSpPr>
+              <p:spPr>
+                <a:xfrm>
+                  <a:off x="8663285" y="5470827"/>
+                  <a:ext cx="112383" cy="115214"/>
+                </a:xfrm>
+                <a:prstGeom prst="ellipse">
+                  <a:avLst/>
+                </a:prstGeom>
+                <a:solidFill>
+                  <a:srgbClr val="6BAD88"/>
+                </a:solidFill>
+                <a:ln>
+                  <a:noFill/>
+                </a:ln>
+              </p:spPr>
+              <p:style>
+                <a:lnRef idx="2">
+                  <a:schemeClr val="accent1">
+                    <a:shade val="50000"/>
+                  </a:schemeClr>
+                </a:lnRef>
+                <a:fillRef idx="1">
+                  <a:schemeClr val="accent1"/>
+                </a:fillRef>
+                <a:effectRef idx="0">
+                  <a:schemeClr val="accent1"/>
+                </a:effectRef>
+                <a:fontRef idx="minor">
+                  <a:schemeClr val="lt1"/>
+                </a:fontRef>
+              </p:style>
+              <p:txBody>
+                <a:bodyPr rtlCol="0" anchor="ctr"/>
+                <a:lstStyle/>
+                <a:p>
+                  <a:pPr algn="ctr"/>
+                  <a:endParaRPr lang="en-US" sz="1400" dirty="0"/>
+                </a:p>
+              </p:txBody>
+            </p:sp>
+            <p:sp>
+              <p:nvSpPr>
+                <p:cNvPr id="60" name="TextBox 59">
+                  <a:extLst>
+                    <a:ext uri="{FF2B5EF4-FFF2-40B4-BE49-F238E27FC236}">
+                      <a16:creationId xmlns:a16="http://schemas.microsoft.com/office/drawing/2014/main" id="{8AF65C7F-47FF-A2A3-AAB0-41DB7809DFC4}"/>
+                    </a:ext>
+                  </a:extLst>
+                </p:cNvPr>
+                <p:cNvSpPr txBox="1"/>
+                <p:nvPr/>
+              </p:nvSpPr>
+              <p:spPr>
+                <a:xfrm>
+                  <a:off x="9023337" y="5363555"/>
+                  <a:ext cx="415932" cy="369332"/>
+                </a:xfrm>
+                <a:prstGeom prst="rect">
+                  <a:avLst/>
+                </a:prstGeom>
+                <a:noFill/>
+              </p:spPr>
+              <p:txBody>
+                <a:bodyPr wrap="square" rtlCol="0">
+                  <a:spAutoFit/>
+                </a:bodyPr>
+                <a:lstStyle/>
+                <a:p>
+                  <a:r>
+                    <a:rPr lang="en-US" dirty="0"/>
+                    <a:t>50</a:t>
+                  </a:r>
+                </a:p>
+              </p:txBody>
+            </p:sp>
+            <p:sp>
+              <p:nvSpPr>
+                <p:cNvPr id="62" name="TextBox 61">
+                  <a:extLst>
+                    <a:ext uri="{FF2B5EF4-FFF2-40B4-BE49-F238E27FC236}">
+                      <a16:creationId xmlns:a16="http://schemas.microsoft.com/office/drawing/2014/main" id="{4E923457-4E30-285B-A6D2-6FA26C163306}"/>
+                    </a:ext>
+                  </a:extLst>
+                </p:cNvPr>
+                <p:cNvSpPr txBox="1"/>
+                <p:nvPr/>
+              </p:nvSpPr>
+              <p:spPr>
+                <a:xfrm>
+                  <a:off x="8137168" y="2795060"/>
+                  <a:ext cx="1154449" cy="646331"/>
+                </a:xfrm>
+                <a:prstGeom prst="rect">
+                  <a:avLst/>
+                </a:prstGeom>
+                <a:noFill/>
+              </p:spPr>
+              <p:txBody>
+                <a:bodyPr wrap="square" rtlCol="0">
+                  <a:spAutoFit/>
+                </a:bodyPr>
+                <a:lstStyle/>
+                <a:p>
+                  <a:pPr algn="ctr"/>
+                  <a:r>
+                    <a:rPr lang="en-US" dirty="0"/>
+                    <a:t>Bigmouth Buffalo</a:t>
+                  </a:r>
+                </a:p>
+              </p:txBody>
+            </p:sp>
+            <p:sp>
+              <p:nvSpPr>
+                <p:cNvPr id="63" name="TextBox 62">
+                  <a:extLst>
+                    <a:ext uri="{FF2B5EF4-FFF2-40B4-BE49-F238E27FC236}">
+                      <a16:creationId xmlns:a16="http://schemas.microsoft.com/office/drawing/2014/main" id="{4BE57C88-C79C-1A20-100B-B2FEF8DCC8EB}"/>
+                    </a:ext>
+                  </a:extLst>
+                </p:cNvPr>
+                <p:cNvSpPr txBox="1"/>
+                <p:nvPr/>
+              </p:nvSpPr>
+              <p:spPr>
+                <a:xfrm>
+                  <a:off x="7153914" y="2790535"/>
+                  <a:ext cx="1154449" cy="646331"/>
+                </a:xfrm>
+                <a:prstGeom prst="rect">
+                  <a:avLst/>
+                </a:prstGeom>
+                <a:noFill/>
+              </p:spPr>
+              <p:txBody>
+                <a:bodyPr wrap="square" rtlCol="0">
+                  <a:spAutoFit/>
+                </a:bodyPr>
+                <a:lstStyle/>
+                <a:p>
+                  <a:pPr algn="ctr"/>
+                  <a:r>
+                    <a:rPr lang="en-US" dirty="0"/>
+                    <a:t>Common Carp</a:t>
+                  </a:r>
+                </a:p>
+              </p:txBody>
+            </p:sp>
+          </p:grpSp>
+          <p:sp>
+            <p:nvSpPr>
+              <p:cNvPr id="11" name="TextBox 10">
+                <a:extLst>
+                  <a:ext uri="{FF2B5EF4-FFF2-40B4-BE49-F238E27FC236}">
+                    <a16:creationId xmlns:a16="http://schemas.microsoft.com/office/drawing/2014/main" id="{2178DAB8-D34B-D0CF-5B8A-2E51E5B859A2}"/>
+                  </a:ext>
+                </a:extLst>
+              </p:cNvPr>
+              <p:cNvSpPr txBox="1"/>
+              <p:nvPr/>
+            </p:nvSpPr>
+            <p:spPr>
+              <a:xfrm>
+                <a:off x="7208506" y="2540126"/>
+                <a:ext cx="2779624" cy="369332"/>
+              </a:xfrm>
+              <a:prstGeom prst="rect">
+                <a:avLst/>
+              </a:prstGeom>
+              <a:noFill/>
+            </p:spPr>
+            <p:txBody>
+              <a:bodyPr wrap="square" rtlCol="0">
+                <a:spAutoFit/>
+              </a:bodyPr>
+              <a:lstStyle/>
+              <a:p>
+                <a:r>
+                  <a:rPr lang="en-US" b="1" dirty="0"/>
+                  <a:t>Biomass Removed (kg ha</a:t>
+                </a:r>
+                <a:r>
+                  <a:rPr lang="en-US" b="1" baseline="30000" dirty="0"/>
+                  <a:t>-1</a:t>
+                </a:r>
+                <a:r>
+                  <a:rPr lang="en-US" b="1" dirty="0"/>
+                  <a:t>)</a:t>
+                </a:r>
+              </a:p>
+            </p:txBody>
+          </p:sp>
+        </p:grpSp>
+      </p:grpSp>
+    </p:spTree>
+    <p:extLst>
+      <p:ext uri="{BB962C8B-B14F-4D97-AF65-F5344CB8AC3E}">
+        <p14:creationId xmlns:p14="http://schemas.microsoft.com/office/powerpoint/2010/main" val="2024177952"/>
+      </p:ext>
+    </p:extLst>
+  </p:cSld>
+  <p:clrMapOvr>
+    <a:masterClrMapping/>
+  </p:clrMapOvr>
+</p:sld>
+</file>
+
+<file path=ppt/slides/slide3.xml><?xml version="1.0" encoding="utf-8"?>
+<p:sld xmlns:a="http://schemas.openxmlformats.org/drawingml/2006/main" xmlns:r="http://schemas.openxmlformats.org/officeDocument/2006/relationships" xmlns:p="http://schemas.openxmlformats.org/presentationml/2006/main">
+  <p:cSld>
+    <p:spTree>
+      <p:nvGrpSpPr>
+        <p:cNvPr id="1" name=""/>
+        <p:cNvGrpSpPr/>
+        <p:nvPr/>
+      </p:nvGrpSpPr>
+      <p:grpSpPr>
+        <a:xfrm>
+          <a:off x="0" y="0"/>
+          <a:ext cx="0" cy="0"/>
+          <a:chOff x="0" y="0"/>
+          <a:chExt cx="0" cy="0"/>
+        </a:xfrm>
+      </p:grpSpPr>
+      <p:grpSp>
+        <p:nvGrpSpPr>
           <p:cNvPr id="12" name="Group 11">
             <a:extLst>
               <a:ext uri="{FF2B5EF4-FFF2-40B4-BE49-F238E27FC236}">
@@ -8589,7 +11111,7 @@
 </p:sld>
 </file>
 
-<file path=ppt/slides/slide3.xml><?xml version="1.0" encoding="utf-8"?>
+<file path=ppt/slides/slide4.xml><?xml version="1.0" encoding="utf-8"?>
 <p:sld xmlns:a="http://schemas.openxmlformats.org/drawingml/2006/main" xmlns:r="http://schemas.openxmlformats.org/officeDocument/2006/relationships" xmlns:p="http://schemas.openxmlformats.org/presentationml/2006/main">
   <p:cSld>
     <p:spTree>
@@ -10934,7 +13456,7 @@
 </p:sld>
 </file>
 
-<file path=ppt/slides/slide4.xml><?xml version="1.0" encoding="utf-8"?>
+<file path=ppt/slides/slide5.xml><?xml version="1.0" encoding="utf-8"?>
 <p:sld xmlns:a="http://schemas.openxmlformats.org/drawingml/2006/main" xmlns:r="http://schemas.openxmlformats.org/officeDocument/2006/relationships" xmlns:p="http://schemas.openxmlformats.org/presentationml/2006/main">
   <p:cSld>
     <p:spTree>

</xml_diff>